<commit_message>
upated assignment for 2012; presentation changes
</commit_message>
<xml_diff>
--- a/CBMG688P_Lab14/best_practices_bisi648b.pptx
+++ b/CBMG688P_Lab14/best_practices_bisi648b.pptx
@@ -5,33 +5,34 @@
     <p:sldMasterId id="2147483685" r:id="rId1"/>
   </p:sldMasterIdLst>
   <p:notesMasterIdLst>
-    <p:notesMasterId r:id="rId26"/>
+    <p:notesMasterId r:id="rId27"/>
   </p:notesMasterIdLst>
   <p:sldIdLst>
     <p:sldId id="256" r:id="rId2"/>
     <p:sldId id="257" r:id="rId3"/>
     <p:sldId id="271" r:id="rId4"/>
-    <p:sldId id="270" r:id="rId5"/>
+    <p:sldId id="286" r:id="rId5"/>
     <p:sldId id="272" r:id="rId6"/>
-    <p:sldId id="284" r:id="rId7"/>
-    <p:sldId id="260" r:id="rId8"/>
-    <p:sldId id="273" r:id="rId9"/>
-    <p:sldId id="262" r:id="rId10"/>
-    <p:sldId id="264" r:id="rId11"/>
-    <p:sldId id="261" r:id="rId12"/>
-    <p:sldId id="263" r:id="rId13"/>
-    <p:sldId id="280" r:id="rId14"/>
-    <p:sldId id="274" r:id="rId15"/>
-    <p:sldId id="268" r:id="rId16"/>
-    <p:sldId id="258" r:id="rId17"/>
-    <p:sldId id="267" r:id="rId18"/>
-    <p:sldId id="275" r:id="rId19"/>
-    <p:sldId id="276" r:id="rId20"/>
-    <p:sldId id="278" r:id="rId21"/>
-    <p:sldId id="279" r:id="rId22"/>
-    <p:sldId id="281" r:id="rId23"/>
-    <p:sldId id="283" r:id="rId24"/>
-    <p:sldId id="285" r:id="rId25"/>
+    <p:sldId id="270" r:id="rId7"/>
+    <p:sldId id="284" r:id="rId8"/>
+    <p:sldId id="260" r:id="rId9"/>
+    <p:sldId id="273" r:id="rId10"/>
+    <p:sldId id="262" r:id="rId11"/>
+    <p:sldId id="264" r:id="rId12"/>
+    <p:sldId id="261" r:id="rId13"/>
+    <p:sldId id="263" r:id="rId14"/>
+    <p:sldId id="280" r:id="rId15"/>
+    <p:sldId id="274" r:id="rId16"/>
+    <p:sldId id="268" r:id="rId17"/>
+    <p:sldId id="258" r:id="rId18"/>
+    <p:sldId id="267" r:id="rId19"/>
+    <p:sldId id="275" r:id="rId20"/>
+    <p:sldId id="276" r:id="rId21"/>
+    <p:sldId id="278" r:id="rId22"/>
+    <p:sldId id="279" r:id="rId23"/>
+    <p:sldId id="281" r:id="rId24"/>
+    <p:sldId id="283" r:id="rId25"/>
+    <p:sldId id="285" r:id="rId26"/>
   </p:sldIdLst>
   <p:sldSz cx="9144000" cy="6858000" type="screen4x3"/>
   <p:notesSz cx="6858000" cy="9144000"/>
@@ -3577,7 +3578,7 @@
             <a:fld id="{D7D6194F-1076-4449-BD84-BD5EB38B9956}" type="datetimeFigureOut">
               <a:rPr lang="en-US" smtClean="0"/>
               <a:pPr/>
-              <a:t>12/9/12</a:t>
+              <a:t>12/10/12</a:t>
             </a:fld>
             <a:endParaRPr lang="en-US"/>
           </a:p>
@@ -3889,29 +3890,6 @@
           </a:bodyPr>
           <a:lstStyle/>
           <a:p>
-            <a:pPr marL="0" marR="0" indent="0" algn="l" defTabSz="457200" rtl="0" eaLnBrk="1" fontAlgn="auto" latinLnBrk="0" hangingPunct="1">
-              <a:lnSpc>
-                <a:spcPct val="100000"/>
-              </a:lnSpc>
-              <a:spcBef>
-                <a:spcPts val="0"/>
-              </a:spcBef>
-              <a:spcAft>
-                <a:spcPts val="0"/>
-              </a:spcAft>
-              <a:buClrTx/>
-              <a:buSzTx/>
-              <a:buFontTx/>
-              <a:buNone/>
-              <a:tabLst/>
-              <a:defRPr/>
-            </a:pPr>
-            <a:r>
-              <a:rPr lang="en-US" dirty="0" smtClean="0"/>
-              <a:t>Most programmers will never need to optimize code for speed or memory.   You should focus instead on accuracy, readability and interfaces.</a:t>
-            </a:r>
-          </a:p>
-          <a:p>
             <a:endParaRPr lang="en-US" dirty="0"/>
           </a:p>
         </p:txBody>
@@ -3996,11 +3974,11 @@
           <a:p>
             <a:r>
               <a:rPr lang="en-US" dirty="0" smtClean="0"/>
-              <a:t>What we have done here is to import</a:t>
+              <a:t>Here I’m going to introduce</a:t>
             </a:r>
             <a:r>
               <a:rPr lang="en-US" baseline="0" dirty="0" smtClean="0"/>
-              <a:t> your module into the repository.  To be safe, and to check things.  We will delete all of this, and then check out the module we made. </a:t>
+              <a:t> some version-control concepts, then (after the lecture part is done) we will do a practical exercise using CVS, a version-control system installed on grace. </a:t>
             </a:r>
             <a:endParaRPr lang="en-US" dirty="0"/>
           </a:p>
@@ -4024,7 +4002,97 @@
             <a:fld id="{77E72B41-B6DC-46B2-9C1F-785DBECD24B6}" type="slidenum">
               <a:rPr lang="en-US" smtClean="0"/>
               <a:pPr/>
-              <a:t>19</a:t>
+              <a:t>15</a:t>
+            </a:fld>
+            <a:endParaRPr lang="en-US"/>
+          </a:p>
+        </p:txBody>
+      </p:sp>
+    </p:spTree>
+  </p:cSld>
+  <p:clrMapOvr>
+    <a:masterClrMapping/>
+  </p:clrMapOvr>
+</p:notes>
+</file>
+
+<file path=ppt/notesSlides/notesSlide11.xml><?xml version="1.0" encoding="utf-8"?>
+<p:notes xmlns:a="http://schemas.openxmlformats.org/drawingml/2006/main" xmlns:r="http://schemas.openxmlformats.org/officeDocument/2006/relationships" xmlns:mc="http://schemas.openxmlformats.org/markup-compatibility/2006" xmlns:mv="urn:schemas-microsoft-com:mac:vml" xmlns:p="http://schemas.openxmlformats.org/presentationml/2006/main" mc:Ignorable="mv" mc:PreserveAttributes="mv:*">
+  <p:cSld>
+    <p:spTree>
+      <p:nvGrpSpPr>
+        <p:cNvPr id="1" name=""/>
+        <p:cNvGrpSpPr/>
+        <p:nvPr/>
+      </p:nvGrpSpPr>
+      <p:grpSpPr>
+        <a:xfrm>
+          <a:off x="0" y="0"/>
+          <a:ext cx="0" cy="0"/>
+          <a:chOff x="0" y="0"/>
+          <a:chExt cx="0" cy="0"/>
+        </a:xfrm>
+      </p:grpSpPr>
+      <p:sp>
+        <p:nvSpPr>
+          <p:cNvPr id="2" name="Slide Image Placeholder 1"/>
+          <p:cNvSpPr>
+            <a:spLocks noGrp="1" noRot="1" noChangeAspect="1"/>
+          </p:cNvSpPr>
+          <p:nvPr>
+            <p:ph type="sldImg"/>
+          </p:nvPr>
+        </p:nvSpPr>
+        <p:spPr/>
+      </p:sp>
+      <p:sp>
+        <p:nvSpPr>
+          <p:cNvPr id="3" name="Notes Placeholder 2"/>
+          <p:cNvSpPr>
+            <a:spLocks noGrp="1"/>
+          </p:cNvSpPr>
+          <p:nvPr>
+            <p:ph type="body" idx="1"/>
+          </p:nvPr>
+        </p:nvSpPr>
+        <p:spPr/>
+        <p:txBody>
+          <a:bodyPr>
+            <a:normAutofit/>
+          </a:bodyPr>
+          <a:lstStyle/>
+          <a:p>
+            <a:r>
+              <a:rPr lang="en-US" dirty="0" smtClean="0"/>
+              <a:t>What we have done here is to import</a:t>
+            </a:r>
+            <a:r>
+              <a:rPr lang="en-US" baseline="0" dirty="0" smtClean="0"/>
+              <a:t> your module into the repository.  To be safe, and to check things.  We will delete all of this, and then check out the module we made. </a:t>
+            </a:r>
+            <a:endParaRPr lang="en-US" dirty="0"/>
+          </a:p>
+        </p:txBody>
+      </p:sp>
+      <p:sp>
+        <p:nvSpPr>
+          <p:cNvPr id="4" name="Slide Number Placeholder 3"/>
+          <p:cNvSpPr>
+            <a:spLocks noGrp="1"/>
+          </p:cNvSpPr>
+          <p:nvPr>
+            <p:ph type="sldNum" sz="quarter" idx="10"/>
+          </p:nvPr>
+        </p:nvSpPr>
+        <p:spPr/>
+        <p:txBody>
+          <a:bodyPr/>
+          <a:lstStyle/>
+          <a:p>
+            <a:fld id="{77E72B41-B6DC-46B2-9C1F-785DBECD24B6}" type="slidenum">
+              <a:rPr lang="en-US" smtClean="0"/>
+              <a:pPr/>
+              <a:t>20</a:t>
             </a:fld>
             <a:endParaRPr lang="en-US"/>
           </a:p>
@@ -4213,13 +4281,8 @@
             </a:pPr>
             <a:r>
               <a:rPr lang="en-US" dirty="0" smtClean="0"/>
-              <a:t>* This is like many technical skills.  You can get a tech or post-doc job for your skill in running</a:t>
-            </a:r>
-            <a:r>
-              <a:rPr lang="en-US" baseline="0" dirty="0" smtClean="0"/>
-              <a:t> an NMR or a sequencing machine– or for programming.  But you will not get a faculty position and you certainly will not get tenure for having this skill.  </a:t>
-            </a:r>
-            <a:endParaRPr lang="en-US" dirty="0" smtClean="0"/>
+              <a:t>Most programmers will never need to optimize code for speed or memory.   You should focus instead on accuracy, readability and interfaces.</a:t>
+            </a:r>
           </a:p>
           <a:p>
             <a:endParaRPr lang="en-US" dirty="0"/>
@@ -4304,9 +4367,26 @@
           </a:bodyPr>
           <a:lstStyle/>
           <a:p>
-            <a:r>
-              <a:rPr lang="en-US" dirty="0" smtClean="0"/>
-              <a:t>Interface vs. implementation</a:t>
+            <a:pPr marL="0" marR="0" indent="0" algn="l" defTabSz="457200" rtl="0" eaLnBrk="1" fontAlgn="auto" latinLnBrk="0" hangingPunct="1">
+              <a:lnSpc>
+                <a:spcPct val="100000"/>
+              </a:lnSpc>
+              <a:spcBef>
+                <a:spcPts val="0"/>
+              </a:spcBef>
+              <a:spcAft>
+                <a:spcPts val="0"/>
+              </a:spcAft>
+              <a:buClrTx/>
+              <a:buSzTx/>
+              <a:buFontTx/>
+              <a:buNone/>
+              <a:tabLst/>
+              <a:defRPr/>
+            </a:pPr>
+            <a:r>
+              <a:rPr lang="en-US" dirty="0" smtClean="0"/>
+              <a:t>Most programmers will never need to optimize code for speed or memory.   You should focus instead on accuracy, readability and interfaces.</a:t>
             </a:r>
           </a:p>
           <a:p>
@@ -4332,7 +4412,7 @@
             <a:fld id="{77E72B41-B6DC-46B2-9C1F-785DBECD24B6}" type="slidenum">
               <a:rPr lang="en-US" smtClean="0"/>
               <a:pPr/>
-              <a:t>7</a:t>
+              <a:t>6</a:t>
             </a:fld>
             <a:endParaRPr lang="en-US"/>
           </a:p>
@@ -4482,12 +4562,10 @@
           <a:p>
             <a:r>
               <a:rPr lang="en-US" dirty="0" smtClean="0"/>
-              <a:t>This is especially important if </a:t>
-            </a:r>
-            <a:r>
-              <a:rPr lang="en-US" baseline="0" dirty="0" smtClean="0"/>
-              <a:t>you already have a package.  It has a bunch of files, probably over 1K lines of code.  You want to be able to make significant changes to the code, but you want to know if this changes things in unanticipated ways.  The test suite will give you that information. The test suite gives you reassurance when you are dealing with users and even with other programmers on your team.  </a:t>
-            </a:r>
+              <a:t>Interface vs. implementation</a:t>
+            </a:r>
+          </a:p>
+          <a:p>
             <a:endParaRPr lang="en-US" dirty="0"/>
           </a:p>
         </p:txBody>
@@ -4510,7 +4588,7 @@
             <a:fld id="{77E72B41-B6DC-46B2-9C1F-785DBECD24B6}" type="slidenum">
               <a:rPr lang="en-US" smtClean="0"/>
               <a:pPr/>
-              <a:t>10</a:t>
+              <a:t>9</a:t>
             </a:fld>
             <a:endParaRPr lang="en-US"/>
           </a:p>
@@ -4570,6 +4648,14 @@
           </a:bodyPr>
           <a:lstStyle/>
           <a:p>
+            <a:r>
+              <a:rPr lang="en-US" dirty="0" smtClean="0"/>
+              <a:t>This is especially important if </a:t>
+            </a:r>
+            <a:r>
+              <a:rPr lang="en-US" baseline="0" dirty="0" smtClean="0"/>
+              <a:t>you already have a package.  It has a bunch of files, probably over 1K lines of code.  You want to be able to make significant changes to the code, but you want to know if this changes things in unanticipated ways.  The test suite will give you that information. The test suite gives you reassurance when you are dealing with users and even with other programmers on your team.  </a:t>
+            </a:r>
             <a:endParaRPr lang="en-US" dirty="0"/>
           </a:p>
         </p:txBody>
@@ -4652,29 +4738,6 @@
           </a:bodyPr>
           <a:lstStyle/>
           <a:p>
-            <a:pPr marL="0" marR="0" indent="0" algn="l" defTabSz="457200" rtl="0" eaLnBrk="1" fontAlgn="auto" latinLnBrk="0" hangingPunct="1">
-              <a:lnSpc>
-                <a:spcPct val="100000"/>
-              </a:lnSpc>
-              <a:spcBef>
-                <a:spcPts val="0"/>
-              </a:spcBef>
-              <a:spcAft>
-                <a:spcPts val="0"/>
-              </a:spcAft>
-              <a:buClrTx/>
-              <a:buSzTx/>
-              <a:buFontTx/>
-              <a:buNone/>
-              <a:tabLst/>
-              <a:defRPr/>
-            </a:pPr>
-            <a:r>
-              <a:rPr lang="en-US" dirty="0" smtClean="0"/>
-              <a:t>Its like having your own archivist who will tag each version with a message, retrieve any version by number or by date, and even show you differences between versions.</a:t>
-            </a:r>
-          </a:p>
-          <a:p>
             <a:endParaRPr lang="en-US" dirty="0"/>
           </a:p>
         </p:txBody>
@@ -4757,14 +4820,29 @@
           </a:bodyPr>
           <a:lstStyle/>
           <a:p>
-            <a:r>
-              <a:rPr lang="en-US" dirty="0" smtClean="0"/>
-              <a:t>Here I’m going to introduce</a:t>
-            </a:r>
-            <a:r>
-              <a:rPr lang="en-US" baseline="0" dirty="0" smtClean="0"/>
-              <a:t> some version-control concepts, then (after the lecture part is done) we will do a practical exercise using CVS, a version-control system installed on grace. </a:t>
-            </a:r>
+            <a:pPr marL="0" marR="0" indent="0" algn="l" defTabSz="457200" rtl="0" eaLnBrk="1" fontAlgn="auto" latinLnBrk="0" hangingPunct="1">
+              <a:lnSpc>
+                <a:spcPct val="100000"/>
+              </a:lnSpc>
+              <a:spcBef>
+                <a:spcPts val="0"/>
+              </a:spcBef>
+              <a:spcAft>
+                <a:spcPts val="0"/>
+              </a:spcAft>
+              <a:buClrTx/>
+              <a:buSzTx/>
+              <a:buFontTx/>
+              <a:buNone/>
+              <a:tabLst/>
+              <a:defRPr/>
+            </a:pPr>
+            <a:r>
+              <a:rPr lang="en-US" dirty="0" smtClean="0"/>
+              <a:t>Its like having your own archivist who will tag each version with a message, retrieve any version by number or by date, and even show you differences between versions.</a:t>
+            </a:r>
+          </a:p>
+          <a:p>
             <a:endParaRPr lang="en-US" dirty="0"/>
           </a:p>
         </p:txBody>
@@ -4787,7 +4865,7 @@
             <a:fld id="{77E72B41-B6DC-46B2-9C1F-785DBECD24B6}" type="slidenum">
               <a:rPr lang="en-US" smtClean="0"/>
               <a:pPr/>
-              <a:t>14</a:t>
+              <a:t>13</a:t>
             </a:fld>
             <a:endParaRPr lang="en-US"/>
           </a:p>
@@ -4836,7 +4914,7 @@
             <a:fld id="{14AE22B4-D1C0-46AC-82DA-FCF814770FF8}" type="datetimeFigureOut">
               <a:rPr lang="en-US" smtClean="0"/>
               <a:pPr/>
-              <a:t>12/9/12</a:t>
+              <a:t>12/10/12</a:t>
             </a:fld>
             <a:endParaRPr lang="en-US"/>
           </a:p>
@@ -5292,7 +5370,7 @@
             <a:fld id="{14AE22B4-D1C0-46AC-82DA-FCF814770FF8}" type="datetimeFigureOut">
               <a:rPr lang="en-US" smtClean="0"/>
               <a:pPr/>
-              <a:t>12/9/12</a:t>
+              <a:t>12/10/12</a:t>
             </a:fld>
             <a:endParaRPr lang="en-US"/>
           </a:p>
@@ -5469,7 +5547,7 @@
             <a:fld id="{14AE22B4-D1C0-46AC-82DA-FCF814770FF8}" type="datetimeFigureOut">
               <a:rPr lang="en-US" smtClean="0"/>
               <a:pPr/>
-              <a:t>12/9/12</a:t>
+              <a:t>12/10/12</a:t>
             </a:fld>
             <a:endParaRPr lang="en-US"/>
           </a:p>
@@ -5636,7 +5714,7 @@
             <a:fld id="{14AE22B4-D1C0-46AC-82DA-FCF814770FF8}" type="datetimeFigureOut">
               <a:rPr lang="en-US" smtClean="0"/>
               <a:pPr/>
-              <a:t>12/9/12</a:t>
+              <a:t>12/10/12</a:t>
             </a:fld>
             <a:endParaRPr lang="en-US"/>
           </a:p>
@@ -7084,7 +7162,7 @@
             <a:fld id="{14AE22B4-D1C0-46AC-82DA-FCF814770FF8}" type="datetimeFigureOut">
               <a:rPr lang="en-US" smtClean="0"/>
               <a:pPr/>
-              <a:t>12/9/12</a:t>
+              <a:t>12/10/12</a:t>
             </a:fld>
             <a:endParaRPr lang="en-US"/>
           </a:p>
@@ -7663,7 +7741,7 @@
             <a:fld id="{14AE22B4-D1C0-46AC-82DA-FCF814770FF8}" type="datetimeFigureOut">
               <a:rPr lang="en-US" smtClean="0"/>
               <a:pPr/>
-              <a:t>12/9/12</a:t>
+              <a:t>12/10/12</a:t>
             </a:fld>
             <a:endParaRPr lang="en-US"/>
           </a:p>
@@ -8089,7 +8167,7 @@
             <a:fld id="{14AE22B4-D1C0-46AC-82DA-FCF814770FF8}" type="datetimeFigureOut">
               <a:rPr lang="en-US" smtClean="0"/>
               <a:pPr/>
-              <a:t>12/9/12</a:t>
+              <a:t>12/10/12</a:t>
             </a:fld>
             <a:endParaRPr lang="en-US"/>
           </a:p>
@@ -8627,7 +8705,7 @@
             <a:fld id="{14AE22B4-D1C0-46AC-82DA-FCF814770FF8}" type="datetimeFigureOut">
               <a:rPr lang="en-US" smtClean="0"/>
               <a:pPr/>
-              <a:t>12/9/12</a:t>
+              <a:t>12/10/12</a:t>
             </a:fld>
             <a:endParaRPr lang="en-US"/>
           </a:p>
@@ -8719,7 +8797,7 @@
             <a:fld id="{14AE22B4-D1C0-46AC-82DA-FCF814770FF8}" type="datetimeFigureOut">
               <a:rPr lang="en-US" smtClean="0"/>
               <a:pPr/>
-              <a:t>12/9/12</a:t>
+              <a:t>12/10/12</a:t>
             </a:fld>
             <a:endParaRPr lang="en-US"/>
           </a:p>
@@ -8966,7 +9044,7 @@
             <a:fld id="{14AE22B4-D1C0-46AC-82DA-FCF814770FF8}" type="datetimeFigureOut">
               <a:rPr lang="en-US" smtClean="0"/>
               <a:pPr/>
-              <a:t>12/9/12</a:t>
+              <a:t>12/10/12</a:t>
             </a:fld>
             <a:endParaRPr lang="en-US"/>
           </a:p>
@@ -9678,7 +9756,7 @@
             <a:fld id="{14AE22B4-D1C0-46AC-82DA-FCF814770FF8}" type="datetimeFigureOut">
               <a:rPr lang="en-US" smtClean="0"/>
               <a:pPr/>
-              <a:t>12/9/12</a:t>
+              <a:t>12/10/12</a:t>
             </a:fld>
             <a:endParaRPr lang="en-US"/>
           </a:p>
@@ -10088,7 +10166,7 @@
             <a:fld id="{14AE22B4-D1C0-46AC-82DA-FCF814770FF8}" type="datetimeFigureOut">
               <a:rPr lang="en-US" smtClean="0"/>
               <a:pPr/>
-              <a:t>12/9/12</a:t>
+              <a:t>12/10/12</a:t>
             </a:fld>
             <a:endParaRPr lang="en-US"/>
           </a:p>
@@ -10540,6 +10618,13 @@
   <p:clrMapOvr>
     <a:masterClrMapping/>
   </p:clrMapOvr>
+  <p:timing>
+    <p:tnLst>
+      <p:par>
+        <p:cTn id="1" dur="indefinite" restart="never" nodeType="tmRoot"/>
+      </p:par>
+    </p:tnLst>
+  </p:timing>
 </p:sld>
 </file>
 
@@ -10577,7 +10662,7 @@
           <a:p>
             <a:r>
               <a:rPr lang="en-US" dirty="0" smtClean="0"/>
-              <a:t>4. Write tests and trap errors</a:t>
+              <a:t>3. Write code to be understood</a:t>
             </a:r>
             <a:endParaRPr lang="en-US" dirty="0"/>
           </a:p>
@@ -10593,101 +10678,159 @@
             <p:ph idx="1"/>
           </p:nvPr>
         </p:nvSpPr>
-        <p:spPr>
-          <a:xfrm>
-            <a:off x="677822" y="1426463"/>
-            <a:ext cx="8008977" cy="5023729"/>
-          </a:xfrm>
-        </p:spPr>
+        <p:spPr/>
         <p:txBody>
           <a:bodyPr>
-            <a:normAutofit lnSpcReduction="10000"/>
+            <a:normAutofit/>
           </a:bodyPr>
           <a:lstStyle/>
           <a:p>
             <a:r>
               <a:rPr lang="en-US" dirty="0" smtClean="0"/>
-              <a:t>Error-trapping </a:t>
+              <a:t>Use informative names </a:t>
             </a:r>
           </a:p>
           <a:p>
             <a:pPr lvl="1"/>
             <a:r>
               <a:rPr lang="en-US" dirty="0" smtClean="0"/>
-              <a:t>Use standard libraries</a:t>
+              <a:t>e.g., $</a:t>
+            </a:r>
+            <a:r>
+              <a:rPr lang="en-US" dirty="0" err="1" smtClean="0"/>
+              <a:t>codonCount</a:t>
+            </a:r>
+            <a:r>
+              <a:rPr lang="en-US" dirty="0" smtClean="0"/>
+              <a:t> not $var1</a:t>
             </a:r>
           </a:p>
           <a:p>
             <a:pPr lvl="1"/>
             <a:r>
               <a:rPr lang="en-US" dirty="0" smtClean="0"/>
-              <a:t>Trap interface violations</a:t>
-            </a:r>
+              <a:t>To compose names, use a rule</a:t>
+            </a:r>
+          </a:p>
+          <a:p>
+            <a:pPr lvl="2"/>
+            <a:r>
+              <a:rPr lang="en-US" sz="1400" b="1" dirty="0" smtClean="0">
+                <a:latin typeface="Monaco"/>
+                <a:cs typeface="Monaco"/>
+              </a:rPr>
+              <a:t>$</a:t>
+            </a:r>
+            <a:r>
+              <a:rPr lang="en-US" sz="1400" b="1" dirty="0" err="1" smtClean="0">
+                <a:latin typeface="Monaco"/>
+                <a:cs typeface="Monaco"/>
+              </a:rPr>
+              <a:t>seq_length_variance</a:t>
+            </a:r>
+            <a:r>
+              <a:rPr lang="en-US" sz="1400" b="1" dirty="0" smtClean="0">
+                <a:latin typeface="Monaco"/>
+                <a:cs typeface="Monaco"/>
+              </a:rPr>
+              <a:t> = &amp;</a:t>
+            </a:r>
+            <a:r>
+              <a:rPr lang="en-US" sz="1400" b="1" dirty="0" err="1" smtClean="0">
+                <a:latin typeface="Monaco"/>
+                <a:cs typeface="Monaco"/>
+              </a:rPr>
+              <a:t>variance_of(&amp;lengths_of(@seqs</a:t>
+            </a:r>
+            <a:r>
+              <a:rPr lang="en-US" sz="1400" b="1" dirty="0" smtClean="0">
+                <a:latin typeface="Monaco"/>
+                <a:cs typeface="Monaco"/>
+              </a:rPr>
+              <a:t>))</a:t>
+            </a:r>
+            <a:endParaRPr lang="en-US" dirty="0" smtClean="0"/>
+          </a:p>
+          <a:p>
+            <a:pPr lvl="2"/>
+            <a:r>
+              <a:rPr lang="en-US" sz="1400" b="1" dirty="0" smtClean="0">
+                <a:latin typeface="Monaco"/>
+                <a:cs typeface="Monaco"/>
+              </a:rPr>
+              <a:t>$</a:t>
+            </a:r>
+            <a:r>
+              <a:rPr lang="en-US" sz="1400" b="1" dirty="0" err="1" smtClean="0">
+                <a:latin typeface="Monaco"/>
+                <a:cs typeface="Monaco"/>
+              </a:rPr>
+              <a:t>seq_length_variance</a:t>
+            </a:r>
+            <a:r>
+              <a:rPr lang="en-US" sz="1400" b="1" dirty="0" smtClean="0">
+                <a:latin typeface="Monaco"/>
+                <a:cs typeface="Monaco"/>
+              </a:rPr>
+              <a:t> = &amp;</a:t>
+            </a:r>
+            <a:r>
+              <a:rPr lang="en-US" sz="1400" b="1" dirty="0" err="1" smtClean="0">
+                <a:latin typeface="Monaco"/>
+                <a:cs typeface="Monaco"/>
+              </a:rPr>
+              <a:t>variance(&amp;seq_lengths(@seqs</a:t>
+            </a:r>
+            <a:r>
+              <a:rPr lang="en-US" sz="1400" b="1" dirty="0" smtClean="0">
+                <a:latin typeface="Monaco"/>
+                <a:cs typeface="Monaco"/>
+              </a:rPr>
+              <a:t>));</a:t>
+            </a:r>
+          </a:p>
+          <a:p>
+            <a:pPr lvl="2"/>
+            <a:endParaRPr lang="en-US" sz="1400" b="1" dirty="0">
+              <a:latin typeface="Monaco"/>
+              <a:cs typeface="Monaco"/>
+            </a:endParaRPr>
           </a:p>
           <a:p>
             <a:pPr lvl="1"/>
             <a:r>
-              <a:rPr lang="en-US" dirty="0" smtClean="0"/>
-              <a:t>Test return of external procedures</a:t>
-            </a:r>
-          </a:p>
-          <a:p>
-            <a:r>
-              <a:rPr lang="en-US" dirty="0" smtClean="0"/>
-              <a:t>Tests</a:t>
+              <a:rPr lang="en-US" dirty="0" err="1" smtClean="0"/>
+              <a:t>gnu_style_underscores</a:t>
+            </a:r>
+            <a:r>
+              <a:rPr lang="en-US" dirty="0" smtClean="0"/>
+              <a:t> or </a:t>
+            </a:r>
+            <a:r>
+              <a:rPr lang="en-US" dirty="0" err="1" smtClean="0"/>
+              <a:t>oldSchoolCamelCase</a:t>
+            </a:r>
+            <a:endParaRPr lang="en-US" dirty="0" smtClean="0"/>
+          </a:p>
+          <a:p>
+            <a:r>
+              <a:rPr lang="en-US" dirty="0" smtClean="0"/>
+              <a:t>Document code internally </a:t>
             </a:r>
           </a:p>
           <a:p>
             <a:pPr lvl="1"/>
             <a:r>
               <a:rPr lang="en-US" dirty="0" smtClean="0"/>
-              <a:t>Use standard libraries, e.g., </a:t>
-            </a:r>
-            <a:r>
-              <a:rPr lang="en-US" dirty="0" err="1" smtClean="0"/>
-              <a:t>Test::More</a:t>
-            </a:r>
-            <a:r>
-              <a:rPr lang="en-US" dirty="0" smtClean="0"/>
-              <a:t> (Perl)</a:t>
+              <a:t>Document interfaces and dependencies</a:t>
             </a:r>
           </a:p>
           <a:p>
             <a:pPr lvl="1"/>
             <a:r>
               <a:rPr lang="en-US" dirty="0" smtClean="0"/>
-              <a:t>Test dependencies </a:t>
-            </a:r>
-          </a:p>
-          <a:p>
-            <a:pPr lvl="1"/>
-            <a:r>
-              <a:rPr lang="en-US" dirty="0" smtClean="0"/>
-              <a:t>Test routines</a:t>
-            </a:r>
-          </a:p>
-          <a:p>
-            <a:pPr lvl="2"/>
-            <a:r>
-              <a:rPr lang="en-US" dirty="0" smtClean="0"/>
-              <a:t>Test general routines with arbitrary cases</a:t>
-            </a:r>
-          </a:p>
-          <a:p>
-            <a:pPr lvl="2"/>
-            <a:r>
-              <a:rPr lang="en-US" dirty="0" smtClean="0"/>
-              <a:t>Test boundary conditions</a:t>
-            </a:r>
-          </a:p>
-          <a:p>
-            <a:pPr lvl="1"/>
-            <a:r>
-              <a:rPr lang="en-US" dirty="0" smtClean="0"/>
-              <a:t>Test interfaces (error trapping)</a:t>
-            </a:r>
-          </a:p>
-          <a:p>
+              <a:t>Document internal functions (methods) </a:t>
+            </a:r>
             <a:endParaRPr lang="en-US" dirty="0"/>
           </a:p>
         </p:txBody>
@@ -10697,6 +10840,13 @@
   <p:clrMapOvr>
     <a:masterClrMapping/>
   </p:clrMapOvr>
+  <p:timing>
+    <p:tnLst>
+      <p:par>
+        <p:cTn id="1" dur="indefinite" restart="never" nodeType="tmRoot"/>
+      </p:par>
+    </p:tnLst>
+  </p:timing>
 </p:sld>
 </file>
 
@@ -10734,11 +10884,7 @@
           <a:p>
             <a:r>
               <a:rPr lang="en-US" dirty="0" smtClean="0"/>
-              <a:t>5. Stamp</a:t>
-            </a:r>
-            <a:r>
-              <a:rPr lang="en-US" baseline="0" dirty="0" smtClean="0"/>
-              <a:t> your output</a:t>
+              <a:t>4. Write tests and trap errors</a:t>
             </a:r>
             <a:endParaRPr lang="en-US" dirty="0"/>
           </a:p>
@@ -10754,64 +10900,98 @@
             <p:ph idx="1"/>
           </p:nvPr>
         </p:nvSpPr>
-        <p:spPr/>
+        <p:spPr>
+          <a:xfrm>
+            <a:off x="677822" y="1426463"/>
+            <a:ext cx="8008977" cy="5023729"/>
+          </a:xfrm>
+        </p:spPr>
         <p:txBody>
           <a:bodyPr>
-            <a:normAutofit/>
+            <a:normAutofit lnSpcReduction="10000"/>
           </a:bodyPr>
           <a:lstStyle/>
           <a:p>
             <a:r>
               <a:rPr lang="en-US" dirty="0" smtClean="0"/>
-              <a:t>Must do</a:t>
+              <a:t>Error-trapping </a:t>
             </a:r>
           </a:p>
           <a:p>
             <a:pPr lvl="1"/>
             <a:r>
               <a:rPr lang="en-US" dirty="0" smtClean="0"/>
-              <a:t>Author</a:t>
+              <a:t>Use standard libraries</a:t>
             </a:r>
           </a:p>
           <a:p>
             <a:pPr lvl="1"/>
             <a:r>
               <a:rPr lang="en-US" dirty="0" smtClean="0"/>
-              <a:t>Date</a:t>
+              <a:t>Trap interface violations</a:t>
             </a:r>
           </a:p>
           <a:p>
             <a:pPr lvl="1"/>
             <a:r>
               <a:rPr lang="en-US" dirty="0" smtClean="0"/>
-              <a:t>Code version</a:t>
-            </a:r>
-          </a:p>
-          <a:p>
-            <a:r>
-              <a:rPr lang="en-US" dirty="0" smtClean="0"/>
-              <a:t>Useful</a:t>
+              <a:t>Test return of external procedures</a:t>
+            </a:r>
+          </a:p>
+          <a:p>
+            <a:r>
+              <a:rPr lang="en-US" dirty="0" smtClean="0"/>
+              <a:t>Tests</a:t>
             </a:r>
           </a:p>
           <a:p>
             <a:pPr lvl="1"/>
             <a:r>
               <a:rPr lang="en-US" dirty="0" smtClean="0"/>
-              <a:t>Settings</a:t>
+              <a:t>Use standard libraries, e.g., </a:t>
+            </a:r>
+            <a:r>
+              <a:rPr lang="en-US" dirty="0" err="1" smtClean="0"/>
+              <a:t>Test::More</a:t>
+            </a:r>
+            <a:r>
+              <a:rPr lang="en-US" dirty="0" smtClean="0"/>
+              <a:t> (Perl)</a:t>
             </a:r>
           </a:p>
           <a:p>
             <a:pPr lvl="1"/>
             <a:r>
               <a:rPr lang="en-US" dirty="0" smtClean="0"/>
-              <a:t>Inputs</a:t>
+              <a:t>Test dependencies </a:t>
             </a:r>
           </a:p>
           <a:p>
             <a:pPr lvl="1"/>
             <a:r>
               <a:rPr lang="en-US" dirty="0" smtClean="0"/>
-              <a:t>Experimental rationale</a:t>
+              <a:t>Test routines</a:t>
+            </a:r>
+          </a:p>
+          <a:p>
+            <a:pPr lvl="2"/>
+            <a:r>
+              <a:rPr lang="en-US" dirty="0" smtClean="0"/>
+              <a:t>Test general routines with arbitrary cases</a:t>
+            </a:r>
+          </a:p>
+          <a:p>
+            <a:pPr lvl="2"/>
+            <a:r>
+              <a:rPr lang="en-US" dirty="0" smtClean="0"/>
+              <a:t>Test boundary conditions</a:t>
+            </a:r>
+          </a:p>
+          <a:p>
+            <a:pPr lvl="1"/>
+            <a:r>
+              <a:rPr lang="en-US" dirty="0" smtClean="0"/>
+              <a:t>Test interfaces (error trapping)</a:t>
             </a:r>
           </a:p>
           <a:p>
@@ -10824,6 +11004,13 @@
   <p:clrMapOvr>
     <a:masterClrMapping/>
   </p:clrMapOvr>
+  <p:timing>
+    <p:tnLst>
+      <p:par>
+        <p:cTn id="1" dur="indefinite" restart="never" nodeType="tmRoot"/>
+      </p:par>
+    </p:tnLst>
+  </p:timing>
 </p:sld>
 </file>
 
@@ -10854,6 +11041,140 @@
             <p:ph type="title"/>
           </p:nvPr>
         </p:nvSpPr>
+        <p:spPr/>
+        <p:txBody>
+          <a:bodyPr/>
+          <a:lstStyle/>
+          <a:p>
+            <a:r>
+              <a:rPr lang="en-US" dirty="0" smtClean="0"/>
+              <a:t>5. Stamp</a:t>
+            </a:r>
+            <a:r>
+              <a:rPr lang="en-US" baseline="0" dirty="0" smtClean="0"/>
+              <a:t> your output</a:t>
+            </a:r>
+            <a:endParaRPr lang="en-US" dirty="0"/>
+          </a:p>
+        </p:txBody>
+      </p:sp>
+      <p:sp>
+        <p:nvSpPr>
+          <p:cNvPr id="3" name="Content Placeholder 2"/>
+          <p:cNvSpPr>
+            <a:spLocks noGrp="1"/>
+          </p:cNvSpPr>
+          <p:nvPr>
+            <p:ph idx="1"/>
+          </p:nvPr>
+        </p:nvSpPr>
+        <p:spPr/>
+        <p:txBody>
+          <a:bodyPr>
+            <a:normAutofit/>
+          </a:bodyPr>
+          <a:lstStyle/>
+          <a:p>
+            <a:r>
+              <a:rPr lang="en-US" dirty="0" smtClean="0"/>
+              <a:t>Must do</a:t>
+            </a:r>
+          </a:p>
+          <a:p>
+            <a:pPr lvl="1"/>
+            <a:r>
+              <a:rPr lang="en-US" dirty="0" smtClean="0"/>
+              <a:t>Author</a:t>
+            </a:r>
+          </a:p>
+          <a:p>
+            <a:pPr lvl="1"/>
+            <a:r>
+              <a:rPr lang="en-US" dirty="0" smtClean="0"/>
+              <a:t>Date</a:t>
+            </a:r>
+          </a:p>
+          <a:p>
+            <a:pPr lvl="1"/>
+            <a:r>
+              <a:rPr lang="en-US" dirty="0" smtClean="0"/>
+              <a:t>Code version</a:t>
+            </a:r>
+          </a:p>
+          <a:p>
+            <a:r>
+              <a:rPr lang="en-US" dirty="0" smtClean="0"/>
+              <a:t>Useful</a:t>
+            </a:r>
+          </a:p>
+          <a:p>
+            <a:pPr lvl="1"/>
+            <a:r>
+              <a:rPr lang="en-US" dirty="0" smtClean="0"/>
+              <a:t>Settings</a:t>
+            </a:r>
+          </a:p>
+          <a:p>
+            <a:pPr lvl="1"/>
+            <a:r>
+              <a:rPr lang="en-US" dirty="0" smtClean="0"/>
+              <a:t>Inputs</a:t>
+            </a:r>
+          </a:p>
+          <a:p>
+            <a:pPr lvl="1"/>
+            <a:r>
+              <a:rPr lang="en-US" dirty="0" smtClean="0"/>
+              <a:t>Experimental rationale</a:t>
+            </a:r>
+          </a:p>
+          <a:p>
+            <a:endParaRPr lang="en-US" dirty="0"/>
+          </a:p>
+        </p:txBody>
+      </p:sp>
+    </p:spTree>
+  </p:cSld>
+  <p:clrMapOvr>
+    <a:masterClrMapping/>
+  </p:clrMapOvr>
+  <p:timing>
+    <p:tnLst>
+      <p:par>
+        <p:cTn id="1" dur="indefinite" restart="never" nodeType="tmRoot"/>
+      </p:par>
+    </p:tnLst>
+  </p:timing>
+</p:sld>
+</file>
+
+<file path=ppt/slides/slide13.xml><?xml version="1.0" encoding="utf-8"?>
+<p:sld xmlns:a="http://schemas.openxmlformats.org/drawingml/2006/main" xmlns:r="http://schemas.openxmlformats.org/officeDocument/2006/relationships" xmlns:mc="http://schemas.openxmlformats.org/markup-compatibility/2006" xmlns:mv="urn:schemas-microsoft-com:mac:vml" xmlns:p="http://schemas.openxmlformats.org/presentationml/2006/main" mc:Ignorable="mv" mc:PreserveAttributes="mv:*">
+  <p:cSld>
+    <p:spTree>
+      <p:nvGrpSpPr>
+        <p:cNvPr id="1" name=""/>
+        <p:cNvGrpSpPr/>
+        <p:nvPr/>
+      </p:nvGrpSpPr>
+      <p:grpSpPr>
+        <a:xfrm>
+          <a:off x="0" y="0"/>
+          <a:ext cx="0" cy="0"/>
+          <a:chOff x="0" y="0"/>
+          <a:chExt cx="0" cy="0"/>
+        </a:xfrm>
+      </p:grpSpPr>
+      <p:sp>
+        <p:nvSpPr>
+          <p:cNvPr id="2" name="Title 1"/>
+          <p:cNvSpPr>
+            <a:spLocks noGrp="1"/>
+          </p:cNvSpPr>
+          <p:nvPr>
+            <p:ph type="title"/>
+          </p:nvPr>
+        </p:nvSpPr>
         <p:spPr>
           <a:xfrm>
             <a:off x="724276" y="274638"/>
@@ -11005,10 +11326,17 @@
   <p:clrMapOvr>
     <a:masterClrMapping/>
   </p:clrMapOvr>
+  <p:timing>
+    <p:tnLst>
+      <p:par>
+        <p:cTn id="1" dur="indefinite" restart="never" nodeType="tmRoot"/>
+      </p:par>
+    </p:tnLst>
+  </p:timing>
 </p:sld>
 </file>
 
-<file path=ppt/slides/slide13.xml><?xml version="1.0" encoding="utf-8"?>
+<file path=ppt/slides/slide14.xml><?xml version="1.0" encoding="utf-8"?>
 <p:sld xmlns:a="http://schemas.openxmlformats.org/drawingml/2006/main" xmlns:r="http://schemas.openxmlformats.org/officeDocument/2006/relationships" xmlns:mc="http://schemas.openxmlformats.org/markup-compatibility/2006" xmlns:mv="urn:schemas-microsoft-com:mac:vml" xmlns:p="http://schemas.openxmlformats.org/presentationml/2006/main" mc:Ignorable="mv" mc:PreserveAttributes="mv:*">
   <p:cSld>
     <p:spTree>
@@ -11132,10 +11460,17 @@
   <p:clrMapOvr>
     <a:masterClrMapping/>
   </p:clrMapOvr>
+  <p:timing>
+    <p:tnLst>
+      <p:par>
+        <p:cTn id="1" dur="indefinite" restart="never" nodeType="tmRoot"/>
+      </p:par>
+    </p:tnLst>
+  </p:timing>
 </p:sld>
 </file>
 
-<file path=ppt/slides/slide14.xml><?xml version="1.0" encoding="utf-8"?>
+<file path=ppt/slides/slide15.xml><?xml version="1.0" encoding="utf-8"?>
 <p:sld xmlns:a="http://schemas.openxmlformats.org/drawingml/2006/main" xmlns:r="http://schemas.openxmlformats.org/officeDocument/2006/relationships" xmlns:mc="http://schemas.openxmlformats.org/markup-compatibility/2006" xmlns:mv="urn:schemas-microsoft-com:mac:vml" xmlns:p="http://schemas.openxmlformats.org/presentationml/2006/main" mc:Ignorable="mv" mc:PreserveAttributes="mv:*">
   <p:cSld>
     <p:spTree>
@@ -11229,10 +11564,17 @@
   <p:clrMapOvr>
     <a:masterClrMapping/>
   </p:clrMapOvr>
+  <p:timing>
+    <p:tnLst>
+      <p:par>
+        <p:cTn id="1" dur="indefinite" restart="never" nodeType="tmRoot"/>
+      </p:par>
+    </p:tnLst>
+  </p:timing>
 </p:sld>
 </file>
 
-<file path=ppt/slides/slide15.xml><?xml version="1.0" encoding="utf-8"?>
+<file path=ppt/slides/slide16.xml><?xml version="1.0" encoding="utf-8"?>
 <p:sld xmlns:a="http://schemas.openxmlformats.org/drawingml/2006/main" xmlns:r="http://schemas.openxmlformats.org/officeDocument/2006/relationships" xmlns:mc="http://schemas.openxmlformats.org/markup-compatibility/2006" xmlns:mv="urn:schemas-microsoft-com:mac:vml" xmlns:p="http://schemas.openxmlformats.org/presentationml/2006/main" mc:Ignorable="mv" mc:PreserveAttributes="mv:*">
   <p:cSld>
     <p:spTree>
@@ -11713,207 +12055,13 @@
   <p:clrMapOvr>
     <a:masterClrMapping/>
   </p:clrMapOvr>
-</p:sld>
-</file>
-
-<file path=ppt/slides/slide16.xml><?xml version="1.0" encoding="utf-8"?>
-<p:sld xmlns:a="http://schemas.openxmlformats.org/drawingml/2006/main" xmlns:r="http://schemas.openxmlformats.org/officeDocument/2006/relationships" xmlns:mc="http://schemas.openxmlformats.org/markup-compatibility/2006" xmlns:mv="urn:schemas-microsoft-com:mac:vml" xmlns:p="http://schemas.openxmlformats.org/presentationml/2006/main" mc:Ignorable="mv" mc:PreserveAttributes="mv:*">
-  <p:cSld>
-    <p:spTree>
-      <p:nvGrpSpPr>
-        <p:cNvPr id="1" name=""/>
-        <p:cNvGrpSpPr/>
-        <p:nvPr/>
-      </p:nvGrpSpPr>
-      <p:grpSpPr>
-        <a:xfrm>
-          <a:off x="0" y="0"/>
-          <a:ext cx="0" cy="0"/>
-          <a:chOff x="0" y="0"/>
-          <a:chExt cx="0" cy="0"/>
-        </a:xfrm>
-      </p:grpSpPr>
-      <p:sp>
-        <p:nvSpPr>
-          <p:cNvPr id="2" name="Title 1"/>
-          <p:cNvSpPr>
-            <a:spLocks noGrp="1"/>
-          </p:cNvSpPr>
-          <p:nvPr>
-            <p:ph type="title"/>
-          </p:nvPr>
-        </p:nvSpPr>
-        <p:spPr/>
-        <p:txBody>
-          <a:bodyPr/>
-          <a:lstStyle/>
-          <a:p>
-            <a:r>
-              <a:rPr lang="en-US" dirty="0" smtClean="0"/>
-              <a:t>4 more recommended practices</a:t>
-            </a:r>
-            <a:endParaRPr lang="en-US" dirty="0"/>
-          </a:p>
-        </p:txBody>
-      </p:sp>
-      <p:sp>
-        <p:nvSpPr>
-          <p:cNvPr id="3" name="Content Placeholder 2"/>
-          <p:cNvSpPr>
-            <a:spLocks noGrp="1"/>
-          </p:cNvSpPr>
-          <p:nvPr>
-            <p:ph idx="1"/>
-          </p:nvPr>
-        </p:nvSpPr>
-        <p:spPr>
-          <a:xfrm>
-            <a:off x="261479" y="1426463"/>
-            <a:ext cx="8425321" cy="5023729"/>
-          </a:xfrm>
-        </p:spPr>
-        <p:txBody>
-          <a:bodyPr>
-            <a:normAutofit fontScale="92500" lnSpcReduction="20000"/>
-          </a:bodyPr>
-          <a:lstStyle/>
-          <a:p>
-            <a:pPr>
-              <a:buNone/>
-            </a:pPr>
-            <a:r>
-              <a:rPr lang="en-US" dirty="0" smtClean="0"/>
-              <a:t>7. Make use of prior art</a:t>
-            </a:r>
-          </a:p>
-          <a:p>
-            <a:pPr lvl="1"/>
-            <a:r>
-              <a:rPr lang="en-US" dirty="0" smtClean="0"/>
-              <a:t>Bio* libraries (e.g., </a:t>
-            </a:r>
-            <a:r>
-              <a:rPr lang="en-US" dirty="0" err="1" smtClean="0"/>
-              <a:t>BioPerl</a:t>
-            </a:r>
-            <a:r>
-              <a:rPr lang="en-US" dirty="0" smtClean="0"/>
-              <a:t>)</a:t>
-            </a:r>
-          </a:p>
-          <a:p>
-            <a:pPr lvl="1"/>
-            <a:r>
-              <a:rPr lang="en-US" dirty="0" smtClean="0"/>
-              <a:t>Utilities (e.g., </a:t>
-            </a:r>
-            <a:r>
-              <a:rPr lang="en-US" dirty="0" err="1" smtClean="0"/>
-              <a:t>Data::Dumper</a:t>
-            </a:r>
-            <a:r>
-              <a:rPr lang="en-US" dirty="0" smtClean="0"/>
-              <a:t>, </a:t>
-            </a:r>
-            <a:r>
-              <a:rPr lang="en-US" dirty="0" err="1" smtClean="0"/>
-              <a:t>Getopt::Long</a:t>
-            </a:r>
-            <a:r>
-              <a:rPr lang="en-US" dirty="0" smtClean="0"/>
-              <a:t>, </a:t>
-            </a:r>
-            <a:r>
-              <a:rPr lang="en-US" dirty="0" err="1" smtClean="0"/>
-              <a:t>XML::Simple</a:t>
-            </a:r>
-            <a:r>
-              <a:rPr lang="en-US" dirty="0" smtClean="0"/>
-              <a:t>)</a:t>
-            </a:r>
-          </a:p>
-          <a:p>
-            <a:pPr>
-              <a:buNone/>
-            </a:pPr>
-            <a:r>
-              <a:rPr lang="en-US" dirty="0" smtClean="0"/>
-              <a:t>8. Create an installable package</a:t>
-            </a:r>
-          </a:p>
-          <a:p>
-            <a:pPr lvl="1"/>
-            <a:r>
-              <a:rPr lang="en-US" dirty="0" smtClean="0"/>
-              <a:t>Include docs, test suite, and sample data </a:t>
-            </a:r>
-          </a:p>
-          <a:p>
-            <a:pPr>
-              <a:buNone/>
-            </a:pPr>
-            <a:r>
-              <a:rPr lang="en-US" dirty="0" smtClean="0"/>
-              <a:t>9. Make your project open source</a:t>
-            </a:r>
-          </a:p>
-          <a:p>
-            <a:pPr>
-              <a:buNone/>
-            </a:pPr>
-            <a:r>
-              <a:rPr lang="en-US" dirty="0" smtClean="0"/>
-              <a:t>10. Set up a project management infrastructure</a:t>
-            </a:r>
-          </a:p>
-          <a:p>
-            <a:pPr lvl="1"/>
-            <a:r>
-              <a:rPr lang="en-US" dirty="0" smtClean="0"/>
-              <a:t>Source code repository </a:t>
-            </a:r>
-          </a:p>
-          <a:p>
-            <a:pPr lvl="1"/>
-            <a:r>
-              <a:rPr lang="en-US" dirty="0" smtClean="0"/>
-              <a:t>Email lists and user forums </a:t>
-            </a:r>
-          </a:p>
-          <a:p>
-            <a:pPr lvl="1"/>
-            <a:r>
-              <a:rPr lang="en-US" dirty="0" smtClean="0"/>
-              <a:t>Web site </a:t>
-            </a:r>
-          </a:p>
-          <a:p>
-            <a:pPr lvl="1"/>
-            <a:r>
-              <a:rPr lang="en-US" dirty="0" smtClean="0"/>
-              <a:t>Downloads page </a:t>
-            </a:r>
-          </a:p>
-          <a:p>
-            <a:pPr lvl="1"/>
-            <a:r>
-              <a:rPr lang="en-US" dirty="0" smtClean="0"/>
-              <a:t>Bug trackers</a:t>
-            </a:r>
-          </a:p>
-          <a:p>
-            <a:pPr>
-              <a:buNone/>
-            </a:pPr>
-            <a:endParaRPr lang="en-US" dirty="0"/>
-          </a:p>
-        </p:txBody>
-      </p:sp>
-    </p:spTree>
-  </p:cSld>
-  <p:clrMapOvr>
-    <a:masterClrMapping/>
-  </p:clrMapOvr>
+  <p:timing>
+    <p:tnLst>
+      <p:par>
+        <p:cTn id="1" dur="indefinite" restart="never" nodeType="tmRoot"/>
+      </p:par>
+    </p:tnLst>
+  </p:timing>
 </p:sld>
 </file>
 
@@ -11944,6 +12092,214 @@
             <p:ph type="title"/>
           </p:nvPr>
         </p:nvSpPr>
+        <p:spPr/>
+        <p:txBody>
+          <a:bodyPr/>
+          <a:lstStyle/>
+          <a:p>
+            <a:r>
+              <a:rPr lang="en-US" dirty="0" smtClean="0"/>
+              <a:t>4 more recommended practices</a:t>
+            </a:r>
+            <a:endParaRPr lang="en-US" dirty="0"/>
+          </a:p>
+        </p:txBody>
+      </p:sp>
+      <p:sp>
+        <p:nvSpPr>
+          <p:cNvPr id="3" name="Content Placeholder 2"/>
+          <p:cNvSpPr>
+            <a:spLocks noGrp="1"/>
+          </p:cNvSpPr>
+          <p:nvPr>
+            <p:ph idx="1"/>
+          </p:nvPr>
+        </p:nvSpPr>
+        <p:spPr>
+          <a:xfrm>
+            <a:off x="261479" y="1426463"/>
+            <a:ext cx="8425321" cy="5023729"/>
+          </a:xfrm>
+        </p:spPr>
+        <p:txBody>
+          <a:bodyPr>
+            <a:normAutofit fontScale="92500" lnSpcReduction="20000"/>
+          </a:bodyPr>
+          <a:lstStyle/>
+          <a:p>
+            <a:pPr>
+              <a:buNone/>
+            </a:pPr>
+            <a:r>
+              <a:rPr lang="en-US" dirty="0" smtClean="0"/>
+              <a:t>7. Make use of prior art</a:t>
+            </a:r>
+          </a:p>
+          <a:p>
+            <a:pPr lvl="1"/>
+            <a:r>
+              <a:rPr lang="en-US" dirty="0" smtClean="0"/>
+              <a:t>Bio* libraries (e.g., </a:t>
+            </a:r>
+            <a:r>
+              <a:rPr lang="en-US" dirty="0" err="1" smtClean="0"/>
+              <a:t>BioPerl</a:t>
+            </a:r>
+            <a:r>
+              <a:rPr lang="en-US" dirty="0" smtClean="0"/>
+              <a:t>)</a:t>
+            </a:r>
+          </a:p>
+          <a:p>
+            <a:pPr lvl="1"/>
+            <a:r>
+              <a:rPr lang="en-US" dirty="0" smtClean="0"/>
+              <a:t>Utilities (e.g., </a:t>
+            </a:r>
+            <a:r>
+              <a:rPr lang="en-US" dirty="0" err="1" smtClean="0"/>
+              <a:t>Data::Dumper</a:t>
+            </a:r>
+            <a:r>
+              <a:rPr lang="en-US" dirty="0" smtClean="0"/>
+              <a:t>, </a:t>
+            </a:r>
+            <a:r>
+              <a:rPr lang="en-US" dirty="0" err="1" smtClean="0"/>
+              <a:t>Getopt::Long</a:t>
+            </a:r>
+            <a:r>
+              <a:rPr lang="en-US" dirty="0" smtClean="0"/>
+              <a:t>, </a:t>
+            </a:r>
+            <a:r>
+              <a:rPr lang="en-US" dirty="0" err="1" smtClean="0"/>
+              <a:t>XML::Simple</a:t>
+            </a:r>
+            <a:r>
+              <a:rPr lang="en-US" dirty="0" smtClean="0"/>
+              <a:t>)</a:t>
+            </a:r>
+          </a:p>
+          <a:p>
+            <a:pPr>
+              <a:buNone/>
+            </a:pPr>
+            <a:r>
+              <a:rPr lang="en-US" dirty="0" smtClean="0"/>
+              <a:t>8. Create an installable package</a:t>
+            </a:r>
+          </a:p>
+          <a:p>
+            <a:pPr lvl="1"/>
+            <a:r>
+              <a:rPr lang="en-US" dirty="0" smtClean="0"/>
+              <a:t>Include docs, test suite, and sample data </a:t>
+            </a:r>
+          </a:p>
+          <a:p>
+            <a:pPr>
+              <a:buNone/>
+            </a:pPr>
+            <a:r>
+              <a:rPr lang="en-US" dirty="0" smtClean="0"/>
+              <a:t>9. Make your project open source</a:t>
+            </a:r>
+          </a:p>
+          <a:p>
+            <a:pPr>
+              <a:buNone/>
+            </a:pPr>
+            <a:r>
+              <a:rPr lang="en-US" dirty="0" smtClean="0"/>
+              <a:t>10. Set up a project management infrastructure</a:t>
+            </a:r>
+          </a:p>
+          <a:p>
+            <a:pPr lvl="1"/>
+            <a:r>
+              <a:rPr lang="en-US" dirty="0" smtClean="0"/>
+              <a:t>Source code repository </a:t>
+            </a:r>
+          </a:p>
+          <a:p>
+            <a:pPr lvl="1"/>
+            <a:r>
+              <a:rPr lang="en-US" dirty="0" smtClean="0"/>
+              <a:t>Email lists and user forums </a:t>
+            </a:r>
+          </a:p>
+          <a:p>
+            <a:pPr lvl="1"/>
+            <a:r>
+              <a:rPr lang="en-US" dirty="0" smtClean="0"/>
+              <a:t>Web site </a:t>
+            </a:r>
+          </a:p>
+          <a:p>
+            <a:pPr lvl="1"/>
+            <a:r>
+              <a:rPr lang="en-US" dirty="0" smtClean="0"/>
+              <a:t>Downloads page </a:t>
+            </a:r>
+          </a:p>
+          <a:p>
+            <a:pPr lvl="1"/>
+            <a:r>
+              <a:rPr lang="en-US" dirty="0" smtClean="0"/>
+              <a:t>Bug trackers</a:t>
+            </a:r>
+          </a:p>
+          <a:p>
+            <a:pPr>
+              <a:buNone/>
+            </a:pPr>
+            <a:endParaRPr lang="en-US" dirty="0"/>
+          </a:p>
+        </p:txBody>
+      </p:sp>
+    </p:spTree>
+  </p:cSld>
+  <p:clrMapOvr>
+    <a:masterClrMapping/>
+  </p:clrMapOvr>
+  <p:timing>
+    <p:tnLst>
+      <p:par>
+        <p:cTn id="1" dur="indefinite" restart="never" nodeType="tmRoot"/>
+      </p:par>
+    </p:tnLst>
+  </p:timing>
+</p:sld>
+</file>
+
+<file path=ppt/slides/slide18.xml><?xml version="1.0" encoding="utf-8"?>
+<p:sld xmlns:a="http://schemas.openxmlformats.org/drawingml/2006/main" xmlns:r="http://schemas.openxmlformats.org/officeDocument/2006/relationships" xmlns:mc="http://schemas.openxmlformats.org/markup-compatibility/2006" xmlns:mv="urn:schemas-microsoft-com:mac:vml" xmlns:p="http://schemas.openxmlformats.org/presentationml/2006/main" mc:Ignorable="mv" mc:PreserveAttributes="mv:*">
+  <p:cSld>
+    <p:spTree>
+      <p:nvGrpSpPr>
+        <p:cNvPr id="1" name=""/>
+        <p:cNvGrpSpPr/>
+        <p:nvPr/>
+      </p:nvGrpSpPr>
+      <p:grpSpPr>
+        <a:xfrm>
+          <a:off x="0" y="0"/>
+          <a:ext cx="0" cy="0"/>
+          <a:chOff x="0" y="0"/>
+          <a:chExt cx="0" cy="0"/>
+        </a:xfrm>
+      </p:grpSpPr>
+      <p:sp>
+        <p:nvSpPr>
+          <p:cNvPr id="2" name="Title 1"/>
+          <p:cNvSpPr>
+            <a:spLocks noGrp="1"/>
+          </p:cNvSpPr>
+          <p:nvPr>
+            <p:ph type="title"/>
+          </p:nvPr>
+        </p:nvSpPr>
         <p:spPr>
           <a:xfrm>
             <a:off x="914400" y="512064"/>
@@ -12044,7 +12400,7 @@
             </a:r>
             <a:r>
               <a:rPr lang="en-US" sz="1800" dirty="0" smtClean="0"/>
-              <a:t>My_BISI648b</a:t>
+              <a:t>My_CBMG688P</a:t>
             </a:r>
           </a:p>
           <a:p>
@@ -12095,7 +12451,7 @@
             </a:r>
             <a:r>
               <a:rPr lang="en-US" sz="1800" dirty="0" smtClean="0"/>
-              <a:t>My_BISI648b</a:t>
+              <a:t>My_CBMG688P</a:t>
             </a:r>
           </a:p>
           <a:p>
@@ -12154,8 +12510,21 @@
             </a:r>
             <a:r>
               <a:rPr lang="en-US" sz="1800" dirty="0" smtClean="0"/>
-              <a:t> /afs/glue.umd.edu/class/fall2011/cbmg/688p/010/public/Lab15 Lab15Link</a:t>
-            </a:r>
+              <a:t> /afs/glue.umd.edu/class/</a:t>
+            </a:r>
+            <a:r>
+              <a:rPr lang="en-US" sz="1800" dirty="0" smtClean="0"/>
+              <a:t>fall2012/</a:t>
+            </a:r>
+            <a:r>
+              <a:rPr lang="en-US" sz="1800" dirty="0" smtClean="0"/>
+              <a:t>cbmg/688p/010/public/</a:t>
+            </a:r>
+            <a:r>
+              <a:rPr lang="en-US" sz="1800" dirty="0" smtClean="0"/>
+              <a:t>Lab14 Lab14Link</a:t>
+            </a:r>
+            <a:endParaRPr lang="en-US" sz="1800" dirty="0" smtClean="0"/>
           </a:p>
           <a:p>
             <a:pPr>
@@ -12213,7 +12582,15 @@
             </a:r>
             <a:r>
               <a:rPr lang="en-US" sz="1800" dirty="0" smtClean="0"/>
-              <a:t> Lab15Link/Perl </a:t>
+              <a:t> </a:t>
+            </a:r>
+            <a:r>
+              <a:rPr lang="en-US" sz="1800" dirty="0" smtClean="0"/>
+              <a:t>Lab14Link</a:t>
+            </a:r>
+            <a:r>
+              <a:rPr lang="en-US" sz="1800" dirty="0" smtClean="0"/>
+              <a:t>/Perl </a:t>
             </a:r>
             <a:r>
               <a:rPr lang="en-US" sz="1800" dirty="0" err="1" smtClean="0"/>
@@ -12238,7 +12615,7 @@
         <p:spPr>
           <a:xfrm>
             <a:off x="1182883" y="1681035"/>
-            <a:ext cx="6544054" cy="923330"/>
+            <a:ext cx="5838933" cy="923330"/>
           </a:xfrm>
           <a:prstGeom prst="rect">
             <a:avLst/>
@@ -12253,7 +12630,23 @@
           <a:p>
             <a:r>
               <a:rPr lang="en-US" dirty="0" smtClean="0"/>
-              <a:t>To follow the lesson, go to Blackboard and open up the lesson plan.  </a:t>
+              <a:t>To follow the lesson, go</a:t>
+            </a:r>
+            <a:r>
+              <a:rPr lang="en-US" dirty="0" smtClean="0"/>
+              <a:t>  </a:t>
+            </a:r>
+            <a:r>
+              <a:rPr lang="en-US" dirty="0" err="1" smtClean="0"/>
+              <a:t>github</a:t>
+            </a:r>
+            <a:r>
+              <a:rPr lang="en-US" dirty="0" smtClean="0"/>
+              <a:t> and </a:t>
+            </a:r>
+            <a:r>
+              <a:rPr lang="en-US" dirty="0" smtClean="0"/>
+              <a:t>open up the lesson plan.  </a:t>
             </a:r>
           </a:p>
           <a:p>
@@ -12273,10 +12666,17 @@
   <p:clrMapOvr>
     <a:masterClrMapping/>
   </p:clrMapOvr>
+  <p:timing>
+    <p:tnLst>
+      <p:par>
+        <p:cTn id="1" dur="indefinite" restart="never" nodeType="tmRoot"/>
+      </p:par>
+    </p:tnLst>
+  </p:timing>
 </p:sld>
 </file>
 
-<file path=ppt/slides/slide18.xml><?xml version="1.0" encoding="utf-8"?>
+<file path=ppt/slides/slide19.xml><?xml version="1.0" encoding="utf-8"?>
 <p:sld xmlns:a="http://schemas.openxmlformats.org/drawingml/2006/main" xmlns:r="http://schemas.openxmlformats.org/officeDocument/2006/relationships" xmlns:mc="http://schemas.openxmlformats.org/markup-compatibility/2006" xmlns:mv="urn:schemas-microsoft-com:mac:vml" xmlns:p="http://schemas.openxmlformats.org/presentationml/2006/main" mc:Ignorable="mv" mc:PreserveAttributes="mv:*">
   <p:cSld>
     <p:spTree>
@@ -12909,10 +13309,17 @@
   <p:clrMapOvr>
     <a:masterClrMapping/>
   </p:clrMapOvr>
+  <p:timing>
+    <p:tnLst>
+      <p:par>
+        <p:cTn id="1" dur="indefinite" restart="never" nodeType="tmRoot"/>
+      </p:par>
+    </p:tnLst>
+  </p:timing>
 </p:sld>
 </file>
 
-<file path=ppt/slides/slide19.xml><?xml version="1.0" encoding="utf-8"?>
+<file path=ppt/slides/slide2.xml><?xml version="1.0" encoding="utf-8"?>
 <p:sld xmlns:a="http://schemas.openxmlformats.org/drawingml/2006/main" xmlns:r="http://schemas.openxmlformats.org/officeDocument/2006/relationships" xmlns:mc="http://schemas.openxmlformats.org/markup-compatibility/2006" xmlns:mv="urn:schemas-microsoft-com:mac:vml" xmlns:p="http://schemas.openxmlformats.org/presentationml/2006/main" mc:Ignorable="mv" mc:PreserveAttributes="mv:*">
   <p:cSld>
     <p:spTree>
@@ -12939,6 +13346,231 @@
             <p:ph type="title"/>
           </p:nvPr>
         </p:nvSpPr>
+        <p:spPr/>
+        <p:txBody>
+          <a:bodyPr/>
+          <a:lstStyle/>
+          <a:p>
+            <a:r>
+              <a:rPr lang="en-US" dirty="0" smtClean="0"/>
+              <a:t>My background</a:t>
+            </a:r>
+            <a:endParaRPr lang="en-US" dirty="0"/>
+          </a:p>
+        </p:txBody>
+      </p:sp>
+      <p:sp>
+        <p:nvSpPr>
+          <p:cNvPr id="3" name="Content Placeholder 2"/>
+          <p:cNvSpPr>
+            <a:spLocks noGrp="1"/>
+          </p:cNvSpPr>
+          <p:nvPr>
+            <p:ph idx="1"/>
+          </p:nvPr>
+        </p:nvSpPr>
+        <p:spPr>
+          <a:xfrm>
+            <a:off x="620804" y="1232759"/>
+            <a:ext cx="8065996" cy="5431537"/>
+          </a:xfrm>
+        </p:spPr>
+        <p:txBody>
+          <a:bodyPr>
+            <a:normAutofit fontScale="62500" lnSpcReduction="20000"/>
+          </a:bodyPr>
+          <a:lstStyle/>
+          <a:p>
+            <a:r>
+              <a:rPr lang="en-US" dirty="0" smtClean="0"/>
+              <a:t>Molecular &amp; evolutionary  biologist</a:t>
+            </a:r>
+          </a:p>
+          <a:p>
+            <a:pPr lvl="1"/>
+            <a:r>
+              <a:rPr lang="en-US" dirty="0" smtClean="0"/>
+              <a:t>No formal training in programming or computer science</a:t>
+            </a:r>
+            <a:endParaRPr lang="en-US" dirty="0" smtClean="0"/>
+          </a:p>
+          <a:p>
+            <a:r>
+              <a:rPr lang="en-US" dirty="0" smtClean="0"/>
+              <a:t>20 years </a:t>
+            </a:r>
+            <a:r>
+              <a:rPr lang="en-US" dirty="0" smtClean="0"/>
+              <a:t>experience as computational biologist</a:t>
+            </a:r>
+          </a:p>
+          <a:p>
+            <a:pPr lvl="1"/>
+            <a:r>
+              <a:rPr lang="en-US" dirty="0" smtClean="0"/>
+              <a:t>Computer-based research published in Science, Nature, PNAS, MBE, Genetics</a:t>
+            </a:r>
+          </a:p>
+          <a:p>
+            <a:r>
+              <a:rPr lang="en-US" dirty="0" smtClean="0"/>
+              <a:t>Experience developing various types of software </a:t>
+            </a:r>
+          </a:p>
+          <a:p>
+            <a:pPr lvl="1"/>
+            <a:r>
+              <a:rPr lang="en-US" dirty="0" smtClean="0"/>
+              <a:t>Heavy-duty Monte Carlo simulation of evolution (C, C++)</a:t>
+            </a:r>
+          </a:p>
+          <a:p>
+            <a:pPr lvl="1"/>
+            <a:r>
+              <a:rPr lang="en-US" dirty="0" smtClean="0"/>
+              <a:t>Automated analysis pipeline with DB (Perl, R, SQL)</a:t>
+            </a:r>
+          </a:p>
+          <a:p>
+            <a:pPr lvl="1"/>
+            <a:r>
+              <a:rPr lang="en-US" dirty="0" smtClean="0"/>
+              <a:t>Web-based user application (JavaScript,  Perl)</a:t>
+            </a:r>
+          </a:p>
+          <a:p>
+            <a:pPr lvl="1"/>
+            <a:r>
+              <a:rPr lang="en-US" dirty="0" smtClean="0"/>
+              <a:t>Utilities and disposable scripts (Perl, R)</a:t>
+            </a:r>
+          </a:p>
+          <a:p>
+            <a:pPr lvl="1"/>
+            <a:r>
+              <a:rPr lang="en-US" dirty="0" err="1" smtClean="0"/>
+              <a:t>Cyberinfrastructure</a:t>
+            </a:r>
+            <a:r>
+              <a:rPr lang="en-US" dirty="0" smtClean="0"/>
+              <a:t> such as </a:t>
+            </a:r>
+            <a:r>
+              <a:rPr lang="en-US" dirty="0" err="1" smtClean="0"/>
+              <a:t>ontologies</a:t>
+            </a:r>
+            <a:r>
+              <a:rPr lang="en-US" dirty="0" smtClean="0"/>
+              <a:t> and formats (Perl, OWL, XML)</a:t>
+            </a:r>
+          </a:p>
+          <a:p>
+            <a:r>
+              <a:rPr lang="en-US" dirty="0" smtClean="0"/>
+              <a:t>Experience with different project types as leader or participant: </a:t>
+            </a:r>
+          </a:p>
+          <a:p>
+            <a:pPr lvl="1"/>
+            <a:r>
+              <a:rPr lang="en-US" dirty="0" smtClean="0"/>
+              <a:t>Single developer</a:t>
+            </a:r>
+          </a:p>
+          <a:p>
+            <a:pPr lvl="1"/>
+            <a:r>
+              <a:rPr lang="en-US" dirty="0" smtClean="0"/>
+              <a:t>Local development team</a:t>
+            </a:r>
+          </a:p>
+          <a:p>
+            <a:pPr lvl="1"/>
+            <a:r>
+              <a:rPr lang="en-US" dirty="0" smtClean="0"/>
+              <a:t>Distributed development  team </a:t>
+            </a:r>
+          </a:p>
+          <a:p>
+            <a:pPr lvl="1"/>
+            <a:r>
+              <a:rPr lang="en-US" dirty="0" smtClean="0"/>
+              <a:t>Agile-programming “</a:t>
+            </a:r>
+            <a:r>
+              <a:rPr lang="en-US" dirty="0" err="1" smtClean="0"/>
+              <a:t>hackathons</a:t>
+            </a:r>
+            <a:r>
+              <a:rPr lang="en-US" dirty="0" smtClean="0"/>
+              <a:t>” </a:t>
+            </a:r>
+          </a:p>
+          <a:p>
+            <a:r>
+              <a:rPr lang="en-US" dirty="0" smtClean="0"/>
+              <a:t>But (and I think this is typical) . . . </a:t>
+            </a:r>
+          </a:p>
+          <a:p>
+            <a:pPr lvl="1"/>
+            <a:r>
+              <a:rPr lang="en-US" dirty="0" smtClean="0"/>
+              <a:t>Only 5 publications focused on software products or designs</a:t>
+            </a:r>
+          </a:p>
+          <a:p>
+            <a:pPr lvl="1"/>
+            <a:r>
+              <a:rPr lang="en-US" dirty="0" smtClean="0"/>
+              <a:t>No product ever used by more than a few dozen people </a:t>
+            </a:r>
+            <a:endParaRPr lang="en-US" dirty="0"/>
+          </a:p>
+        </p:txBody>
+      </p:sp>
+    </p:spTree>
+  </p:cSld>
+  <p:clrMapOvr>
+    <a:masterClrMapping/>
+  </p:clrMapOvr>
+  <p:timing>
+    <p:tnLst>
+      <p:par>
+        <p:cTn id="1" dur="indefinite" restart="never" nodeType="tmRoot"/>
+      </p:par>
+    </p:tnLst>
+  </p:timing>
+</p:sld>
+</file>
+
+<file path=ppt/slides/slide20.xml><?xml version="1.0" encoding="utf-8"?>
+<p:sld xmlns:a="http://schemas.openxmlformats.org/drawingml/2006/main" xmlns:r="http://schemas.openxmlformats.org/officeDocument/2006/relationships" xmlns:mc="http://schemas.openxmlformats.org/markup-compatibility/2006" xmlns:mv="urn:schemas-microsoft-com:mac:vml" xmlns:p="http://schemas.openxmlformats.org/presentationml/2006/main" mc:Ignorable="mv" mc:PreserveAttributes="mv:*">
+  <p:cSld>
+    <p:spTree>
+      <p:nvGrpSpPr>
+        <p:cNvPr id="1" name=""/>
+        <p:cNvGrpSpPr/>
+        <p:nvPr/>
+      </p:nvGrpSpPr>
+      <p:grpSpPr>
+        <a:xfrm>
+          <a:off x="0" y="0"/>
+          <a:ext cx="0" cy="0"/>
+          <a:chOff x="0" y="0"/>
+          <a:chExt cx="0" cy="0"/>
+        </a:xfrm>
+      </p:grpSpPr>
+      <p:sp>
+        <p:nvSpPr>
+          <p:cNvPr id="2" name="Title 1"/>
+          <p:cNvSpPr>
+            <a:spLocks noGrp="1"/>
+          </p:cNvSpPr>
+          <p:nvPr>
+            <p:ph type="title"/>
+          </p:nvPr>
+        </p:nvSpPr>
         <p:spPr>
           <a:xfrm>
             <a:off x="914400" y="512064"/>
@@ -13044,7 +13676,19 @@
                   <a:srgbClr val="FFFFFF"/>
                 </a:solidFill>
               </a:rPr>
-              <a:t> My_BISI648b; </a:t>
+              <a:t> </a:t>
+            </a:r>
+            <a:r>
+              <a:rPr lang="en-US" sz="1800" dirty="0" smtClean="0"/>
+              <a:t>My_CBMG688P</a:t>
+            </a:r>
+            <a:r>
+              <a:rPr lang="en-US" sz="1800" dirty="0" smtClean="0">
+                <a:solidFill>
+                  <a:srgbClr val="FFFFFF"/>
+                </a:solidFill>
+              </a:rPr>
+              <a:t>; </a:t>
             </a:r>
             <a:r>
               <a:rPr lang="en-US" sz="1800" dirty="0" err="1" smtClean="0">
@@ -13265,7 +13909,19 @@
                   <a:srgbClr val="FFFFFF"/>
                 </a:solidFill>
               </a:rPr>
-              <a:t> "</a:t>
+              <a:t> </a:t>
+            </a:r>
+            <a:r>
+              <a:rPr lang="en-US" sz="1800" dirty="0" smtClean="0">
+                <a:solidFill>
+                  <a:srgbClr val="FFFFFF"/>
+                </a:solidFill>
+              </a:rPr>
+              <a:t>"</a:t>
+            </a:r>
+            <a:r>
+              <a:rPr lang="en-US" sz="1800" dirty="0" smtClean="0"/>
+              <a:t>My_CBMG688P</a:t>
             </a:r>
             <a:r>
               <a:rPr lang="en-US" sz="1800" dirty="0" smtClean="0">
@@ -13275,7 +13931,17 @@
                   </a:schemeClr>
                 </a:solidFill>
               </a:rPr>
-              <a:t>BISI648b code</a:t>
+              <a:t> </a:t>
+            </a:r>
+            <a:r>
+              <a:rPr lang="en-US" sz="1800" dirty="0" smtClean="0">
+                <a:solidFill>
+                  <a:schemeClr val="tx1">
+                    <a:lumMod val="85000"/>
+                  </a:schemeClr>
+                </a:solidFill>
+              </a:rPr>
+              <a:t>code</a:t>
             </a:r>
             <a:r>
               <a:rPr lang="en-US" sz="1800" dirty="0" smtClean="0">
@@ -13375,13 +14041,14 @@
           <a:lstStyle/>
           <a:p>
             <a:r>
-              <a:rPr lang="en-US" dirty="0" smtClean="0">
-                <a:solidFill>
-                  <a:srgbClr val="FFFFFF"/>
-                </a:solidFill>
-              </a:rPr>
-              <a:t>My_BISI648b</a:t>
-            </a:r>
+              <a:rPr lang="en-US" dirty="0" smtClean="0"/>
+              <a:t>My_CBMG688P</a:t>
+            </a:r>
+            <a:endParaRPr lang="en-US" dirty="0" smtClean="0">
+              <a:solidFill>
+                <a:srgbClr val="FFFFFF"/>
+              </a:solidFill>
+            </a:endParaRPr>
           </a:p>
           <a:p>
             <a:pPr lvl="1"/>
@@ -13391,7 +14058,7 @@
                   <a:srgbClr val="FFFFFF"/>
                 </a:solidFill>
               </a:rPr>
-              <a:t>Lab15Link</a:t>
+              <a:t>Lab14Link</a:t>
             </a:r>
           </a:p>
           <a:p>
@@ -13583,13 +14250,14 @@
             <a:lstStyle/>
             <a:p>
               <a:r>
-                <a:rPr lang="en-US" dirty="0" smtClean="0">
-                  <a:solidFill>
-                    <a:srgbClr val="FFFFFF"/>
-                  </a:solidFill>
-                </a:rPr>
-                <a:t>My_BISI648b</a:t>
+                <a:rPr lang="en-US" dirty="0" smtClean="0"/>
+                <a:t>My_CBMG688P</a:t>
               </a:r>
+              <a:endParaRPr lang="en-US" dirty="0" smtClean="0">
+                <a:solidFill>
+                  <a:srgbClr val="FFFFFF"/>
+                </a:solidFill>
+              </a:endParaRPr>
             </a:p>
             <a:p>
               <a:pPr lvl="1"/>
@@ -13599,7 +14267,7 @@
                     <a:srgbClr val="FFFFFF"/>
                   </a:solidFill>
                 </a:rPr>
-                <a:t>Lab15Link</a:t>
+                <a:t>Lab14Link</a:t>
               </a:r>
             </a:p>
             <a:p>
@@ -13755,7 +14423,7 @@
 </p:sld>
 </file>
 
-<file path=ppt/slides/slide2.xml><?xml version="1.0" encoding="utf-8"?>
+<file path=ppt/slides/slide21.xml><?xml version="1.0" encoding="utf-8"?>
 <p:sld xmlns:a="http://schemas.openxmlformats.org/drawingml/2006/main" xmlns:r="http://schemas.openxmlformats.org/officeDocument/2006/relationships" xmlns:mc="http://schemas.openxmlformats.org/markup-compatibility/2006" xmlns:mv="urn:schemas-microsoft-com:mac:vml" xmlns:p="http://schemas.openxmlformats.org/presentationml/2006/main" mc:Ignorable="mv" mc:PreserveAttributes="mv:*">
   <p:cSld>
     <p:spTree>
@@ -13782,223 +14450,6 @@
             <p:ph type="title"/>
           </p:nvPr>
         </p:nvSpPr>
-        <p:spPr/>
-        <p:txBody>
-          <a:bodyPr/>
-          <a:lstStyle/>
-          <a:p>
-            <a:r>
-              <a:rPr lang="en-US" dirty="0" smtClean="0"/>
-              <a:t>My background</a:t>
-            </a:r>
-            <a:endParaRPr lang="en-US" dirty="0"/>
-          </a:p>
-        </p:txBody>
-      </p:sp>
-      <p:sp>
-        <p:nvSpPr>
-          <p:cNvPr id="3" name="Content Placeholder 2"/>
-          <p:cNvSpPr>
-            <a:spLocks noGrp="1"/>
-          </p:cNvSpPr>
-          <p:nvPr>
-            <p:ph idx="1"/>
-          </p:nvPr>
-        </p:nvSpPr>
-        <p:spPr>
-          <a:xfrm>
-            <a:off x="620804" y="1232759"/>
-            <a:ext cx="8065996" cy="5431537"/>
-          </a:xfrm>
-        </p:spPr>
-        <p:txBody>
-          <a:bodyPr>
-            <a:normAutofit fontScale="62500" lnSpcReduction="20000"/>
-          </a:bodyPr>
-          <a:lstStyle/>
-          <a:p>
-            <a:r>
-              <a:rPr lang="en-US" dirty="0" smtClean="0"/>
-              <a:t>Molecular &amp; evolutionary  biologist</a:t>
-            </a:r>
-          </a:p>
-          <a:p>
-            <a:pPr lvl="1"/>
-            <a:r>
-              <a:rPr lang="en-US" dirty="0" smtClean="0"/>
-              <a:t>No formal training in programming or computer science</a:t>
-            </a:r>
-          </a:p>
-          <a:p>
-            <a:r>
-              <a:rPr lang="en-US" dirty="0" smtClean="0"/>
-              <a:t>19 </a:t>
-            </a:r>
-            <a:r>
-              <a:rPr lang="en-US" dirty="0" smtClean="0"/>
-              <a:t>years experience as computational biologist</a:t>
-            </a:r>
-          </a:p>
-          <a:p>
-            <a:pPr lvl="1"/>
-            <a:r>
-              <a:rPr lang="en-US" dirty="0" smtClean="0"/>
-              <a:t>Computer-based research published in Science, Nature, PNAS, MBE, Genetics</a:t>
-            </a:r>
-          </a:p>
-          <a:p>
-            <a:r>
-              <a:rPr lang="en-US" dirty="0" smtClean="0"/>
-              <a:t>Experience developing various types of software </a:t>
-            </a:r>
-          </a:p>
-          <a:p>
-            <a:pPr lvl="1"/>
-            <a:r>
-              <a:rPr lang="en-US" dirty="0" smtClean="0"/>
-              <a:t>Heavy-duty Monte Carlo simulation of evolution (C, C++)</a:t>
-            </a:r>
-          </a:p>
-          <a:p>
-            <a:pPr lvl="1"/>
-            <a:r>
-              <a:rPr lang="en-US" dirty="0" smtClean="0"/>
-              <a:t>Automated analysis pipeline with DB (Perl, R, SQL)</a:t>
-            </a:r>
-          </a:p>
-          <a:p>
-            <a:pPr lvl="1"/>
-            <a:r>
-              <a:rPr lang="en-US" dirty="0" smtClean="0"/>
-              <a:t>Web-based user application (JavaScript,  Perl)</a:t>
-            </a:r>
-          </a:p>
-          <a:p>
-            <a:pPr lvl="1"/>
-            <a:r>
-              <a:rPr lang="en-US" dirty="0" smtClean="0"/>
-              <a:t>Utilities and disposable scripts (Perl, R)</a:t>
-            </a:r>
-          </a:p>
-          <a:p>
-            <a:pPr lvl="1"/>
-            <a:r>
-              <a:rPr lang="en-US" dirty="0" err="1" smtClean="0"/>
-              <a:t>Cyberinfrastructure</a:t>
-            </a:r>
-            <a:r>
-              <a:rPr lang="en-US" dirty="0" smtClean="0"/>
-              <a:t> such as </a:t>
-            </a:r>
-            <a:r>
-              <a:rPr lang="en-US" dirty="0" err="1" smtClean="0"/>
-              <a:t>ontologies</a:t>
-            </a:r>
-            <a:r>
-              <a:rPr lang="en-US" dirty="0" smtClean="0"/>
-              <a:t> and formats (Perl, OWL, XML)</a:t>
-            </a:r>
-          </a:p>
-          <a:p>
-            <a:r>
-              <a:rPr lang="en-US" dirty="0" smtClean="0"/>
-              <a:t>Experience with different project types as leader or participant: </a:t>
-            </a:r>
-          </a:p>
-          <a:p>
-            <a:pPr lvl="1"/>
-            <a:r>
-              <a:rPr lang="en-US" dirty="0" smtClean="0"/>
-              <a:t>Single developer</a:t>
-            </a:r>
-          </a:p>
-          <a:p>
-            <a:pPr lvl="1"/>
-            <a:r>
-              <a:rPr lang="en-US" dirty="0" smtClean="0"/>
-              <a:t>Local development team</a:t>
-            </a:r>
-          </a:p>
-          <a:p>
-            <a:pPr lvl="1"/>
-            <a:r>
-              <a:rPr lang="en-US" dirty="0" smtClean="0"/>
-              <a:t>Distributed development  team </a:t>
-            </a:r>
-          </a:p>
-          <a:p>
-            <a:pPr lvl="1"/>
-            <a:r>
-              <a:rPr lang="en-US" dirty="0" smtClean="0"/>
-              <a:t>Agile-programming “</a:t>
-            </a:r>
-            <a:r>
-              <a:rPr lang="en-US" dirty="0" err="1" smtClean="0"/>
-              <a:t>hackathons</a:t>
-            </a:r>
-            <a:r>
-              <a:rPr lang="en-US" dirty="0" smtClean="0"/>
-              <a:t>” </a:t>
-            </a:r>
-          </a:p>
-          <a:p>
-            <a:r>
-              <a:rPr lang="en-US" dirty="0" smtClean="0"/>
-              <a:t>But (and I think this is typical) . . . </a:t>
-            </a:r>
-          </a:p>
-          <a:p>
-            <a:pPr lvl="1"/>
-            <a:r>
-              <a:rPr lang="en-US" dirty="0" smtClean="0"/>
-              <a:t>Only 5 publications focused on software products or designs</a:t>
-            </a:r>
-          </a:p>
-          <a:p>
-            <a:pPr lvl="1"/>
-            <a:r>
-              <a:rPr lang="en-US" dirty="0" smtClean="0"/>
-              <a:t>No product ever used by more than a few dozen people </a:t>
-            </a:r>
-            <a:endParaRPr lang="en-US" dirty="0"/>
-          </a:p>
-        </p:txBody>
-      </p:sp>
-    </p:spTree>
-  </p:cSld>
-  <p:clrMapOvr>
-    <a:masterClrMapping/>
-  </p:clrMapOvr>
-</p:sld>
-</file>
-
-<file path=ppt/slides/slide20.xml><?xml version="1.0" encoding="utf-8"?>
-<p:sld xmlns:a="http://schemas.openxmlformats.org/drawingml/2006/main" xmlns:r="http://schemas.openxmlformats.org/officeDocument/2006/relationships" xmlns:mc="http://schemas.openxmlformats.org/markup-compatibility/2006" xmlns:mv="urn:schemas-microsoft-com:mac:vml" xmlns:p="http://schemas.openxmlformats.org/presentationml/2006/main" mc:Ignorable="mv" mc:PreserveAttributes="mv:*">
-  <p:cSld>
-    <p:spTree>
-      <p:nvGrpSpPr>
-        <p:cNvPr id="1" name=""/>
-        <p:cNvGrpSpPr/>
-        <p:nvPr/>
-      </p:nvGrpSpPr>
-      <p:grpSpPr>
-        <a:xfrm>
-          <a:off x="0" y="0"/>
-          <a:ext cx="0" cy="0"/>
-          <a:chOff x="0" y="0"/>
-          <a:chExt cx="0" cy="0"/>
-        </a:xfrm>
-      </p:grpSpPr>
-      <p:sp>
-        <p:nvSpPr>
-          <p:cNvPr id="2" name="Title 1"/>
-          <p:cNvSpPr>
-            <a:spLocks noGrp="1"/>
-          </p:cNvSpPr>
-          <p:nvPr>
-            <p:ph type="title"/>
-          </p:nvPr>
-        </p:nvSpPr>
         <p:spPr>
           <a:xfrm>
             <a:off x="385994" y="512064"/>
@@ -14180,7 +14631,7 @@
 </p:sld>
 </file>
 
-<file path=ppt/slides/slide21.xml><?xml version="1.0" encoding="utf-8"?>
+<file path=ppt/slides/slide22.xml><?xml version="1.0" encoding="utf-8"?>
 <p:sld xmlns:a="http://schemas.openxmlformats.org/drawingml/2006/main" xmlns:r="http://schemas.openxmlformats.org/officeDocument/2006/relationships" xmlns:mc="http://schemas.openxmlformats.org/markup-compatibility/2006" xmlns:mv="urn:schemas-microsoft-com:mac:vml" xmlns:p="http://schemas.openxmlformats.org/presentationml/2006/main" mc:Ignorable="mv" mc:PreserveAttributes="mv:*">
   <p:cSld>
     <p:spTree>
@@ -14489,7 +14940,7 @@
 </p:sld>
 </file>
 
-<file path=ppt/slides/slide22.xml><?xml version="1.0" encoding="utf-8"?>
+<file path=ppt/slides/slide23.xml><?xml version="1.0" encoding="utf-8"?>
 <p:sld xmlns:a="http://schemas.openxmlformats.org/drawingml/2006/main" xmlns:r="http://schemas.openxmlformats.org/officeDocument/2006/relationships" xmlns:mc="http://schemas.openxmlformats.org/markup-compatibility/2006" xmlns:mv="urn:schemas-microsoft-com:mac:vml" xmlns:p="http://schemas.openxmlformats.org/presentationml/2006/main" mc:Ignorable="mv" mc:PreserveAttributes="mv:*">
   <p:cSld>
     <p:spTree>
@@ -14585,7 +15036,7 @@
 </p:sld>
 </file>
 
-<file path=ppt/slides/slide23.xml><?xml version="1.0" encoding="utf-8"?>
+<file path=ppt/slides/slide24.xml><?xml version="1.0" encoding="utf-8"?>
 <p:sld xmlns:a="http://schemas.openxmlformats.org/drawingml/2006/main" xmlns:r="http://schemas.openxmlformats.org/officeDocument/2006/relationships" xmlns:mc="http://schemas.openxmlformats.org/markup-compatibility/2006" xmlns:mv="urn:schemas-microsoft-com:mac:vml" xmlns:p="http://schemas.openxmlformats.org/presentationml/2006/main" mc:Ignorable="mv" mc:PreserveAttributes="mv:*">
   <p:cSld>
     <p:spTree>
@@ -14669,7 +15120,7 @@
 </p:sld>
 </file>
 
-<file path=ppt/slides/slide24.xml><?xml version="1.0" encoding="utf-8"?>
+<file path=ppt/slides/slide25.xml><?xml version="1.0" encoding="utf-8"?>
 <p:sld xmlns:a="http://schemas.openxmlformats.org/drawingml/2006/main" xmlns:r="http://schemas.openxmlformats.org/officeDocument/2006/relationships" xmlns:mc="http://schemas.openxmlformats.org/markup-compatibility/2006" xmlns:mv="urn:schemas-microsoft-com:mac:vml" xmlns:p="http://schemas.openxmlformats.org/presentationml/2006/main" mc:Ignorable="mv" mc:PreserveAttributes="mv:*">
   <p:cSld>
     <p:spTree>
@@ -15076,6 +15527,13 @@
   <p:clrMapOvr>
     <a:masterClrMapping/>
   </p:clrMapOvr>
+  <p:timing>
+    <p:tnLst>
+      <p:par>
+        <p:cTn id="1" dur="indefinite" restart="never" nodeType="tmRoot"/>
+      </p:par>
+    </p:tnLst>
+  </p:timing>
 </p:sld>
 </file>
 
@@ -15108,8 +15566,8 @@
         </p:nvSpPr>
         <p:spPr>
           <a:xfrm>
-            <a:off x="199222" y="323755"/>
-            <a:ext cx="8740885" cy="914400"/>
+            <a:off x="199222" y="323754"/>
+            <a:ext cx="8740885" cy="1827373"/>
           </a:xfrm>
         </p:spPr>
         <p:txBody>
@@ -15118,7 +15576,7 @@
           <a:p>
             <a:r>
               <a:rPr lang="en-US" dirty="0" smtClean="0"/>
-              <a:t>Given what scientific programmers actually do, best practices should . . . </a:t>
+              <a:t>Best practices</a:t>
             </a:r>
             <a:endParaRPr lang="en-US" dirty="0"/>
           </a:p>
@@ -15126,7 +15584,7 @@
       </p:sp>
       <p:sp>
         <p:nvSpPr>
-          <p:cNvPr id="3" name="Content Placeholder 2"/>
+          <p:cNvPr id="4" name="Content Placeholder 3"/>
           <p:cNvSpPr>
             <a:spLocks noGrp="1"/>
           </p:cNvSpPr>
@@ -15136,145 +15594,32 @@
         </p:nvSpPr>
         <p:spPr>
           <a:xfrm>
-            <a:off x="914400" y="1426463"/>
-            <a:ext cx="7772400" cy="5213247"/>
+            <a:off x="532610" y="1783560"/>
+            <a:ext cx="8154190" cy="4572000"/>
           </a:xfrm>
         </p:spPr>
         <p:txBody>
-          <a:bodyPr>
-            <a:normAutofit fontScale="70000" lnSpcReduction="20000"/>
-          </a:bodyPr>
+          <a:bodyPr/>
           <a:lstStyle/>
           <a:p>
             <a:r>
               <a:rPr lang="en-US" dirty="0" smtClean="0"/>
-              <a:t>Focus primarily on project-relevant goals</a:t>
-            </a:r>
-          </a:p>
-          <a:p>
-            <a:pPr lvl="1"/>
-            <a:r>
-              <a:rPr lang="en-US" dirty="0" smtClean="0"/>
-              <a:t>Accuracy and robustness</a:t>
-            </a:r>
-          </a:p>
-          <a:p>
-            <a:pPr lvl="2"/>
-            <a:r>
-              <a:rPr lang="en-US" dirty="0" smtClean="0"/>
-              <a:t>Testing</a:t>
-            </a:r>
-          </a:p>
-          <a:p>
-            <a:pPr lvl="2"/>
-            <a:r>
-              <a:rPr lang="en-US" dirty="0" smtClean="0"/>
-              <a:t>More testing</a:t>
-            </a:r>
-          </a:p>
-          <a:p>
-            <a:pPr lvl="1"/>
-            <a:r>
-              <a:rPr lang="en-US" dirty="0" smtClean="0"/>
-              <a:t>Provenance</a:t>
-            </a:r>
-          </a:p>
-          <a:p>
-            <a:pPr lvl="2"/>
-            <a:r>
-              <a:rPr lang="en-US" dirty="0" smtClean="0"/>
-              <a:t>Revision control</a:t>
-            </a:r>
-          </a:p>
-          <a:p>
-            <a:pPr lvl="2"/>
-            <a:r>
-              <a:rPr lang="en-US" dirty="0" smtClean="0"/>
-              <a:t>Output stamps </a:t>
-            </a:r>
-          </a:p>
-          <a:p>
-            <a:r>
-              <a:rPr lang="en-US" dirty="0" smtClean="0"/>
-              <a:t>And secondarily on  software as re-useable product</a:t>
-            </a:r>
-          </a:p>
-          <a:p>
-            <a:pPr lvl="1"/>
-            <a:r>
-              <a:rPr lang="en-US" dirty="0" smtClean="0"/>
-              <a:t>Interoperability</a:t>
-            </a:r>
-          </a:p>
-          <a:p>
-            <a:pPr lvl="2"/>
-            <a:r>
-              <a:rPr lang="en-US" dirty="0" smtClean="0"/>
-              <a:t>Standard interfaces</a:t>
-            </a:r>
-          </a:p>
-          <a:p>
-            <a:pPr lvl="2"/>
-            <a:r>
-              <a:rPr lang="en-US" dirty="0" smtClean="0"/>
-              <a:t>Robustness in diverse environments</a:t>
-            </a:r>
-          </a:p>
-          <a:p>
-            <a:pPr lvl="1"/>
-            <a:r>
-              <a:rPr lang="en-US" dirty="0" smtClean="0"/>
-              <a:t>Accessibility to other users like yourself</a:t>
-            </a:r>
-          </a:p>
-          <a:p>
-            <a:pPr lvl="2"/>
-            <a:r>
-              <a:rPr lang="en-US" dirty="0" smtClean="0"/>
-              <a:t>Readability </a:t>
-            </a:r>
-          </a:p>
-          <a:p>
-            <a:pPr lvl="2"/>
-            <a:r>
-              <a:rPr lang="en-US" dirty="0" smtClean="0"/>
-              <a:t>Documentation</a:t>
-            </a:r>
-          </a:p>
-          <a:p>
-            <a:pPr lvl="2"/>
-            <a:r>
-              <a:rPr lang="en-US" dirty="0" smtClean="0"/>
-              <a:t>Open-source license</a:t>
-            </a:r>
-          </a:p>
-          <a:p>
-            <a:pPr lvl="1"/>
-            <a:r>
-              <a:rPr lang="en-US" dirty="0" smtClean="0"/>
-              <a:t>Maintainability </a:t>
-            </a:r>
-          </a:p>
-          <a:p>
-            <a:pPr lvl="2"/>
-            <a:r>
-              <a:rPr lang="en-US" dirty="0" smtClean="0"/>
-              <a:t>Revision control</a:t>
-            </a:r>
-          </a:p>
-          <a:p>
-            <a:pPr lvl="2"/>
-            <a:r>
-              <a:rPr lang="en-US" dirty="0" smtClean="0"/>
-              <a:t>Readability </a:t>
-            </a:r>
-          </a:p>
-          <a:p>
-            <a:pPr lvl="2"/>
-            <a:r>
-              <a:rPr lang="en-US" dirty="0" smtClean="0"/>
-              <a:t>Community project infrastructure</a:t>
-            </a:r>
+              <a:t>Don’t let the perfect be the enemy of the good</a:t>
+            </a:r>
+          </a:p>
+          <a:p>
+            <a:r>
+              <a:rPr lang="en-US" dirty="0" smtClean="0"/>
+              <a:t>Invest effort strategically, depending on what kind of software you are </a:t>
+            </a:r>
+            <a:r>
+              <a:rPr lang="en-US" dirty="0" err="1" smtClean="0"/>
+              <a:t>developig</a:t>
+            </a:r>
+            <a:endParaRPr lang="en-US" dirty="0" smtClean="0"/>
+          </a:p>
+          <a:p>
+            <a:endParaRPr lang="en-US" dirty="0"/>
           </a:p>
         </p:txBody>
       </p:sp>
@@ -15283,6 +15628,13 @@
   <p:clrMapOvr>
     <a:masterClrMapping/>
   </p:clrMapOvr>
+  <p:timing>
+    <p:tnLst>
+      <p:par>
+        <p:cTn id="1" dur="indefinite" restart="never" nodeType="tmRoot"/>
+      </p:par>
+    </p:tnLst>
+  </p:timing>
 </p:sld>
 </file>
 
@@ -15325,7 +15677,15 @@
           <a:p>
             <a:r>
               <a:rPr lang="en-US" dirty="0" smtClean="0"/>
-              <a:t>How much to invest in best practices?</a:t>
+              <a:t>Efficiently investing effort in best</a:t>
+            </a:r>
+            <a:r>
+              <a:rPr lang="en-US" dirty="0" smtClean="0"/>
+              <a:t> </a:t>
+            </a:r>
+            <a:r>
+              <a:rPr lang="en-US" dirty="0" smtClean="0"/>
+              <a:t>practices</a:t>
             </a:r>
             <a:endParaRPr lang="en-US" dirty="0"/>
           </a:p>
@@ -15637,6 +15997,13 @@
   <p:clrMapOvr>
     <a:masterClrMapping/>
   </p:clrMapOvr>
+  <p:timing>
+    <p:tnLst>
+      <p:par>
+        <p:cTn id="1" dur="indefinite" restart="never" nodeType="tmRoot"/>
+      </p:par>
+    </p:tnLst>
+  </p:timing>
 </p:sld>
 </file>
 
@@ -15667,14 +16034,19 @@
             <p:ph type="title"/>
           </p:nvPr>
         </p:nvSpPr>
-        <p:spPr/>
+        <p:spPr>
+          <a:xfrm>
+            <a:off x="199222" y="323755"/>
+            <a:ext cx="8740885" cy="914400"/>
+          </a:xfrm>
+        </p:spPr>
         <p:txBody>
           <a:bodyPr/>
           <a:lstStyle/>
           <a:p>
             <a:r>
               <a:rPr lang="en-US" dirty="0" smtClean="0"/>
-              <a:t>A list of best practices</a:t>
+              <a:t>Given what scientific programmers actually do, best practices should . . . </a:t>
             </a:r>
             <a:endParaRPr lang="en-US" dirty="0"/>
           </a:p>
@@ -15692,147 +16064,145 @@
         </p:nvSpPr>
         <p:spPr>
           <a:xfrm>
-            <a:off x="540858" y="1426464"/>
-            <a:ext cx="8145942" cy="4871288"/>
+            <a:off x="914400" y="1426463"/>
+            <a:ext cx="7772400" cy="5213247"/>
           </a:xfrm>
         </p:spPr>
         <p:txBody>
           <a:bodyPr>
-            <a:normAutofit fontScale="92500" lnSpcReduction="10000"/>
+            <a:normAutofit fontScale="70000" lnSpcReduction="20000"/>
           </a:bodyPr>
           <a:lstStyle/>
           <a:p>
-            <a:pPr marL="582930" indent="-514350">
-              <a:buFont typeface="+mj-lt"/>
-              <a:buAutoNum type="arabicPeriod"/>
-            </a:pPr>
-            <a:r>
-              <a:rPr lang="en-US" dirty="0" smtClean="0">
-                <a:solidFill>
-                  <a:srgbClr val="F273AF"/>
-                </a:solidFill>
-              </a:rPr>
-              <a:t>Interface, interface, interface</a:t>
-            </a:r>
-          </a:p>
-          <a:p>
-            <a:pPr marL="582930" indent="-514350">
-              <a:buFont typeface="+mj-lt"/>
-              <a:buAutoNum type="arabicPeriod"/>
-            </a:pPr>
-            <a:r>
-              <a:rPr lang="en-US" dirty="0" smtClean="0">
-                <a:solidFill>
-                  <a:srgbClr val="F273AF"/>
-                </a:solidFill>
-              </a:rPr>
-              <a:t>Modularize</a:t>
-            </a:r>
-          </a:p>
-          <a:p>
-            <a:pPr marL="582930" indent="-514350">
-              <a:buFont typeface="+mj-lt"/>
-              <a:buAutoNum type="arabicPeriod"/>
-            </a:pPr>
-            <a:r>
-              <a:rPr lang="en-US" dirty="0" smtClean="0">
-                <a:solidFill>
-                  <a:srgbClr val="F273AF"/>
-                </a:solidFill>
-              </a:rPr>
-              <a:t>Write code to be understood</a:t>
-            </a:r>
-          </a:p>
-          <a:p>
-            <a:pPr marL="582930" indent="-514350">
-              <a:buFont typeface="+mj-lt"/>
-              <a:buAutoNum type="arabicPeriod"/>
-            </a:pPr>
-            <a:r>
-              <a:rPr lang="en-US" dirty="0" smtClean="0"/>
-              <a:t>Write tests and trap errors </a:t>
-            </a:r>
-          </a:p>
-          <a:p>
-            <a:pPr marL="582930" indent="-514350">
-              <a:buFont typeface="+mj-lt"/>
-              <a:buAutoNum type="arabicPeriod"/>
-            </a:pPr>
-            <a:r>
-              <a:rPr lang="en-US" dirty="0" smtClean="0">
-                <a:solidFill>
-                  <a:schemeClr val="accent2">
-                    <a:lumMod val="60000"/>
-                    <a:lumOff val="40000"/>
-                  </a:schemeClr>
-                </a:solidFill>
-              </a:rPr>
-              <a:t>Stamp your output</a:t>
-            </a:r>
-          </a:p>
-          <a:p>
-            <a:pPr marL="582930" indent="-514350">
-              <a:buFont typeface="+mj-lt"/>
-              <a:buAutoNum type="arabicPeriod"/>
-            </a:pPr>
-            <a:r>
-              <a:rPr lang="en-US" dirty="0" smtClean="0">
-                <a:solidFill>
-                  <a:srgbClr val="F273AF"/>
-                </a:solidFill>
-              </a:rPr>
-              <a:t>Use revision control</a:t>
-            </a:r>
-          </a:p>
-          <a:p>
-            <a:pPr marL="582930" indent="-514350">
-              <a:buFont typeface="+mj-lt"/>
-              <a:buAutoNum type="arabicPeriod"/>
-            </a:pPr>
-            <a:r>
-              <a:rPr lang="en-US" dirty="0" smtClean="0">
-                <a:solidFill>
-                  <a:srgbClr val="F273AF"/>
-                </a:solidFill>
-              </a:rPr>
-              <a:t>Make use of prior art</a:t>
-            </a:r>
-          </a:p>
-          <a:p>
-            <a:pPr marL="582930" indent="-514350">
-              <a:buFont typeface="+mj-lt"/>
-              <a:buAutoNum type="arabicPeriod"/>
-            </a:pPr>
-            <a:r>
-              <a:rPr lang="en-US" dirty="0" smtClean="0"/>
-              <a:t>Create an installable package</a:t>
-            </a:r>
-          </a:p>
-          <a:p>
-            <a:pPr marL="582930" indent="-514350">
-              <a:buFont typeface="+mj-lt"/>
-              <a:buAutoNum type="arabicPeriod"/>
-            </a:pPr>
-            <a:r>
-              <a:rPr lang="en-US" dirty="0" smtClean="0"/>
-              <a:t>Make your project open source</a:t>
-            </a:r>
-          </a:p>
-          <a:p>
-            <a:pPr marL="582930" indent="-514350">
-              <a:buFont typeface="+mj-lt"/>
-              <a:buAutoNum type="arabicPeriod"/>
-            </a:pPr>
-            <a:r>
-              <a:rPr lang="en-US" dirty="0" smtClean="0"/>
-              <a:t>Set up a project management infrastructure</a:t>
-            </a:r>
-          </a:p>
-          <a:p>
-            <a:pPr>
-              <a:buNone/>
-            </a:pPr>
-            <a:endParaRPr lang="en-US" dirty="0"/>
+            <a:r>
+              <a:rPr lang="en-US" dirty="0" smtClean="0"/>
+              <a:t>Focus primarily on project-relevant goals</a:t>
+            </a:r>
+          </a:p>
+          <a:p>
+            <a:pPr lvl="1"/>
+            <a:r>
+              <a:rPr lang="en-US" dirty="0" smtClean="0"/>
+              <a:t>Accuracy and robustness</a:t>
+            </a:r>
+          </a:p>
+          <a:p>
+            <a:pPr lvl="2"/>
+            <a:r>
+              <a:rPr lang="en-US" dirty="0" smtClean="0"/>
+              <a:t>Testing</a:t>
+            </a:r>
+          </a:p>
+          <a:p>
+            <a:pPr lvl="2"/>
+            <a:r>
+              <a:rPr lang="en-US" dirty="0" smtClean="0"/>
+              <a:t>More testing</a:t>
+            </a:r>
+          </a:p>
+          <a:p>
+            <a:pPr lvl="1"/>
+            <a:r>
+              <a:rPr lang="en-US" dirty="0" smtClean="0"/>
+              <a:t>Provenance</a:t>
+            </a:r>
+          </a:p>
+          <a:p>
+            <a:pPr lvl="2"/>
+            <a:r>
+              <a:rPr lang="en-US" dirty="0" smtClean="0"/>
+              <a:t>Revision control</a:t>
+            </a:r>
+          </a:p>
+          <a:p>
+            <a:pPr lvl="2"/>
+            <a:r>
+              <a:rPr lang="en-US" dirty="0" smtClean="0"/>
+              <a:t>Output stamps </a:t>
+            </a:r>
+          </a:p>
+          <a:p>
+            <a:r>
+              <a:rPr lang="en-US" dirty="0" smtClean="0"/>
+              <a:t>And secondarily on  software as re-useable product</a:t>
+            </a:r>
+          </a:p>
+          <a:p>
+            <a:pPr lvl="1"/>
+            <a:r>
+              <a:rPr lang="en-US" dirty="0" smtClean="0"/>
+              <a:t>Interoperability</a:t>
+            </a:r>
+          </a:p>
+          <a:p>
+            <a:pPr lvl="2"/>
+            <a:r>
+              <a:rPr lang="en-US" dirty="0" smtClean="0"/>
+              <a:t>Standard interfaces</a:t>
+            </a:r>
+          </a:p>
+          <a:p>
+            <a:pPr lvl="2"/>
+            <a:r>
+              <a:rPr lang="en-US" dirty="0" smtClean="0"/>
+              <a:t>Robustness in diverse environments</a:t>
+            </a:r>
+          </a:p>
+          <a:p>
+            <a:pPr lvl="1"/>
+            <a:r>
+              <a:rPr lang="en-US" dirty="0" smtClean="0"/>
+              <a:t>Accessibility to other users like yourself</a:t>
+            </a:r>
+          </a:p>
+          <a:p>
+            <a:pPr lvl="2"/>
+            <a:r>
+              <a:rPr lang="en-US" dirty="0" smtClean="0"/>
+              <a:t>Readability </a:t>
+            </a:r>
+          </a:p>
+          <a:p>
+            <a:pPr lvl="2"/>
+            <a:r>
+              <a:rPr lang="en-US" dirty="0" smtClean="0"/>
+              <a:t>Documentation</a:t>
+            </a:r>
+          </a:p>
+          <a:p>
+            <a:pPr lvl="2"/>
+            <a:r>
+              <a:rPr lang="en-US" dirty="0" smtClean="0"/>
+              <a:t>Open-source license</a:t>
+            </a:r>
+          </a:p>
+          <a:p>
+            <a:pPr lvl="1"/>
+            <a:r>
+              <a:rPr lang="en-US" dirty="0" smtClean="0"/>
+              <a:t>Maintainability </a:t>
+            </a:r>
+          </a:p>
+          <a:p>
+            <a:pPr lvl="2"/>
+            <a:r>
+              <a:rPr lang="en-US" dirty="0" smtClean="0"/>
+              <a:t>Revision control</a:t>
+            </a:r>
+          </a:p>
+          <a:p>
+            <a:pPr lvl="2"/>
+            <a:r>
+              <a:rPr lang="en-US" dirty="0" smtClean="0"/>
+              <a:t>Readability </a:t>
+            </a:r>
+          </a:p>
+          <a:p>
+            <a:pPr lvl="2"/>
+            <a:r>
+              <a:rPr lang="en-US" dirty="0" smtClean="0"/>
+              <a:t>Community project infrastructure</a:t>
+            </a:r>
           </a:p>
         </p:txBody>
       </p:sp>
@@ -15841,6 +16211,13 @@
   <p:clrMapOvr>
     <a:masterClrMapping/>
   </p:clrMapOvr>
+  <p:timing>
+    <p:tnLst>
+      <p:par>
+        <p:cTn id="1" dur="indefinite" restart="never" nodeType="tmRoot"/>
+      </p:par>
+    </p:tnLst>
+  </p:timing>
 </p:sld>
 </file>
 
@@ -15871,23 +16248,14 @@
             <p:ph type="title"/>
           </p:nvPr>
         </p:nvSpPr>
-        <p:spPr>
-          <a:xfrm>
-            <a:off x="914400" y="512064"/>
-            <a:ext cx="7772400" cy="914400"/>
-          </a:xfrm>
-        </p:spPr>
+        <p:spPr/>
         <p:txBody>
           <a:bodyPr/>
           <a:lstStyle/>
           <a:p>
             <a:r>
               <a:rPr lang="en-US" dirty="0" smtClean="0"/>
-              <a:t>1. Interface,</a:t>
-            </a:r>
-            <a:r>
-              <a:rPr lang="en-US" baseline="0" dirty="0" smtClean="0"/>
-              <a:t> interface, interface</a:t>
+              <a:t>A list of best practices</a:t>
             </a:r>
             <a:endParaRPr lang="en-US" dirty="0"/>
           </a:p>
@@ -15905,104 +16273,146 @@
         </p:nvSpPr>
         <p:spPr>
           <a:xfrm>
-            <a:off x="186771" y="1257662"/>
-            <a:ext cx="8500029" cy="5304599"/>
+            <a:off x="540858" y="1426464"/>
+            <a:ext cx="8145942" cy="4871288"/>
           </a:xfrm>
         </p:spPr>
         <p:txBody>
           <a:bodyPr>
-            <a:normAutofit lnSpcReduction="10000"/>
+            <a:normAutofit fontScale="92500" lnSpcReduction="10000"/>
           </a:bodyPr>
           <a:lstStyle/>
           <a:p>
-            <a:r>
-              <a:rPr lang="en-US" dirty="0" smtClean="0"/>
-              <a:t>Write your interfaces first</a:t>
-            </a:r>
-          </a:p>
-          <a:p>
-            <a:r>
-              <a:rPr lang="en-US" dirty="0" smtClean="0"/>
-              <a:t>Learn to use standard interfaces</a:t>
-            </a:r>
-          </a:p>
-          <a:p>
-            <a:pPr lvl="1"/>
-            <a:r>
-              <a:rPr lang="en-US" dirty="0" smtClean="0"/>
-              <a:t>Command-line with GNU-style long options</a:t>
-            </a:r>
-          </a:p>
-          <a:p>
-            <a:pPr lvl="1"/>
-            <a:r>
-              <a:rPr lang="en-US" dirty="0" smtClean="0"/>
-              <a:t>Data interfaces like SQL</a:t>
-            </a:r>
-          </a:p>
-          <a:p>
-            <a:pPr lvl="1"/>
-            <a:r>
-              <a:rPr lang="en-US" dirty="0" smtClean="0"/>
-              <a:t>File formats</a:t>
-            </a:r>
-          </a:p>
-          <a:p>
-            <a:pPr lvl="2"/>
-            <a:r>
-              <a:rPr lang="en-US" dirty="0" smtClean="0"/>
-              <a:t>if possible, domain-specific formats (e.g., FASTA, NEXUS)</a:t>
-            </a:r>
-          </a:p>
-          <a:p>
-            <a:pPr lvl="2"/>
-            <a:r>
-              <a:rPr lang="en-US" dirty="0" smtClean="0"/>
-              <a:t>if not, flexible &amp; auto-</a:t>
-            </a:r>
-            <a:r>
-              <a:rPr lang="en-US" dirty="0" err="1" smtClean="0"/>
-              <a:t>parseable</a:t>
-            </a:r>
-            <a:r>
-              <a:rPr lang="en-US" dirty="0" smtClean="0"/>
-              <a:t> formats like </a:t>
-            </a:r>
-          </a:p>
-          <a:p>
-            <a:pPr lvl="3"/>
-            <a:r>
-              <a:rPr lang="en-US" dirty="0" smtClean="0"/>
-              <a:t>XML files </a:t>
-            </a:r>
-          </a:p>
-          <a:p>
-            <a:pPr lvl="3"/>
-            <a:r>
-              <a:rPr lang="en-US" dirty="0" smtClean="0"/>
-              <a:t>CSV files</a:t>
-            </a:r>
-          </a:p>
-          <a:p>
-            <a:pPr lvl="3"/>
-            <a:r>
-              <a:rPr lang="en-US" dirty="0" smtClean="0"/>
-              <a:t>SQL command files</a:t>
-            </a:r>
-          </a:p>
-          <a:p>
-            <a:pPr lvl="3"/>
-            <a:r>
-              <a:rPr lang="en-US" dirty="0" smtClean="0"/>
-              <a:t>Perl dump files</a:t>
-            </a:r>
-          </a:p>
-          <a:p>
-            <a:pPr lvl="2"/>
-            <a:r>
-              <a:rPr lang="en-US" dirty="0" smtClean="0"/>
-              <a:t>Think twice before inventing another ad hoc text format</a:t>
-            </a:r>
+            <a:pPr marL="582930" indent="-514350">
+              <a:buFont typeface="+mj-lt"/>
+              <a:buAutoNum type="arabicPeriod"/>
+            </a:pPr>
+            <a:r>
+              <a:rPr lang="en-US" dirty="0" smtClean="0">
+                <a:solidFill>
+                  <a:srgbClr val="F273AF"/>
+                </a:solidFill>
+              </a:rPr>
+              <a:t>Interface, interface, interface</a:t>
+            </a:r>
+          </a:p>
+          <a:p>
+            <a:pPr marL="582930" indent="-514350">
+              <a:buFont typeface="+mj-lt"/>
+              <a:buAutoNum type="arabicPeriod"/>
+            </a:pPr>
+            <a:r>
+              <a:rPr lang="en-US" dirty="0" smtClean="0">
+                <a:solidFill>
+                  <a:srgbClr val="F273AF"/>
+                </a:solidFill>
+              </a:rPr>
+              <a:t>Modularize</a:t>
+            </a:r>
+          </a:p>
+          <a:p>
+            <a:pPr marL="582930" indent="-514350">
+              <a:buFont typeface="+mj-lt"/>
+              <a:buAutoNum type="arabicPeriod"/>
+            </a:pPr>
+            <a:r>
+              <a:rPr lang="en-US" dirty="0" smtClean="0">
+                <a:solidFill>
+                  <a:srgbClr val="F273AF"/>
+                </a:solidFill>
+              </a:rPr>
+              <a:t>Write code to be understood</a:t>
+            </a:r>
+          </a:p>
+          <a:p>
+            <a:pPr marL="582930" indent="-514350">
+              <a:buFont typeface="+mj-lt"/>
+              <a:buAutoNum type="arabicPeriod"/>
+            </a:pPr>
+            <a:r>
+              <a:rPr lang="en-US" dirty="0" smtClean="0"/>
+              <a:t>Write tests and trap errors </a:t>
+            </a:r>
+          </a:p>
+          <a:p>
+            <a:pPr marL="582930" indent="-514350">
+              <a:buFont typeface="+mj-lt"/>
+              <a:buAutoNum type="arabicPeriod"/>
+            </a:pPr>
+            <a:r>
+              <a:rPr lang="en-US" dirty="0" smtClean="0">
+                <a:solidFill>
+                  <a:schemeClr val="accent2">
+                    <a:lumMod val="60000"/>
+                    <a:lumOff val="40000"/>
+                  </a:schemeClr>
+                </a:solidFill>
+              </a:rPr>
+              <a:t>Stamp your output</a:t>
+            </a:r>
+          </a:p>
+          <a:p>
+            <a:pPr marL="582930" indent="-514350">
+              <a:buFont typeface="+mj-lt"/>
+              <a:buAutoNum type="arabicPeriod"/>
+            </a:pPr>
+            <a:r>
+              <a:rPr lang="en-US" dirty="0" smtClean="0">
+                <a:solidFill>
+                  <a:srgbClr val="F273AF"/>
+                </a:solidFill>
+              </a:rPr>
+              <a:t>Use revision control</a:t>
+            </a:r>
+          </a:p>
+          <a:p>
+            <a:pPr marL="582930" indent="-514350">
+              <a:buFont typeface="+mj-lt"/>
+              <a:buAutoNum type="arabicPeriod"/>
+            </a:pPr>
+            <a:r>
+              <a:rPr lang="en-US" dirty="0" smtClean="0">
+                <a:solidFill>
+                  <a:srgbClr val="F273AF"/>
+                </a:solidFill>
+              </a:rPr>
+              <a:t>Make use of prior art</a:t>
+            </a:r>
+          </a:p>
+          <a:p>
+            <a:pPr marL="582930" indent="-514350">
+              <a:buFont typeface="+mj-lt"/>
+              <a:buAutoNum type="arabicPeriod"/>
+            </a:pPr>
+            <a:r>
+              <a:rPr lang="en-US" dirty="0" smtClean="0"/>
+              <a:t>Create an installable package</a:t>
+            </a:r>
+          </a:p>
+          <a:p>
+            <a:pPr marL="582930" indent="-514350">
+              <a:buFont typeface="+mj-lt"/>
+              <a:buAutoNum type="arabicPeriod"/>
+            </a:pPr>
+            <a:r>
+              <a:rPr lang="en-US" dirty="0" smtClean="0"/>
+              <a:t>Make your project open source</a:t>
+            </a:r>
+          </a:p>
+          <a:p>
+            <a:pPr marL="582930" indent="-514350">
+              <a:buFont typeface="+mj-lt"/>
+              <a:buAutoNum type="arabicPeriod"/>
+            </a:pPr>
+            <a:r>
+              <a:rPr lang="en-US" dirty="0" smtClean="0"/>
+              <a:t>Set up a project management infrastructure</a:t>
+            </a:r>
+          </a:p>
+          <a:p>
+            <a:pPr>
+              <a:buNone/>
+            </a:pPr>
             <a:endParaRPr lang="en-US" dirty="0"/>
           </a:p>
         </p:txBody>
@@ -16012,10 +16422,195 @@
   <p:clrMapOvr>
     <a:masterClrMapping/>
   </p:clrMapOvr>
+  <p:timing>
+    <p:tnLst>
+      <p:par>
+        <p:cTn id="1" dur="indefinite" restart="never" nodeType="tmRoot"/>
+      </p:par>
+    </p:tnLst>
+  </p:timing>
 </p:sld>
 </file>
 
 <file path=ppt/slides/slide8.xml><?xml version="1.0" encoding="utf-8"?>
+<p:sld xmlns:a="http://schemas.openxmlformats.org/drawingml/2006/main" xmlns:r="http://schemas.openxmlformats.org/officeDocument/2006/relationships" xmlns:mc="http://schemas.openxmlformats.org/markup-compatibility/2006" xmlns:mv="urn:schemas-microsoft-com:mac:vml" xmlns:p="http://schemas.openxmlformats.org/presentationml/2006/main" mc:Ignorable="mv" mc:PreserveAttributes="mv:*">
+  <p:cSld>
+    <p:spTree>
+      <p:nvGrpSpPr>
+        <p:cNvPr id="1" name=""/>
+        <p:cNvGrpSpPr/>
+        <p:nvPr/>
+      </p:nvGrpSpPr>
+      <p:grpSpPr>
+        <a:xfrm>
+          <a:off x="0" y="0"/>
+          <a:ext cx="0" cy="0"/>
+          <a:chOff x="0" y="0"/>
+          <a:chExt cx="0" cy="0"/>
+        </a:xfrm>
+      </p:grpSpPr>
+      <p:sp>
+        <p:nvSpPr>
+          <p:cNvPr id="2" name="Title 1"/>
+          <p:cNvSpPr>
+            <a:spLocks noGrp="1"/>
+          </p:cNvSpPr>
+          <p:nvPr>
+            <p:ph type="title"/>
+          </p:nvPr>
+        </p:nvSpPr>
+        <p:spPr>
+          <a:xfrm>
+            <a:off x="914400" y="512064"/>
+            <a:ext cx="7772400" cy="914400"/>
+          </a:xfrm>
+        </p:spPr>
+        <p:txBody>
+          <a:bodyPr/>
+          <a:lstStyle/>
+          <a:p>
+            <a:r>
+              <a:rPr lang="en-US" dirty="0" smtClean="0"/>
+              <a:t>1. Interface,</a:t>
+            </a:r>
+            <a:r>
+              <a:rPr lang="en-US" baseline="0" dirty="0" smtClean="0"/>
+              <a:t> interface, interface</a:t>
+            </a:r>
+            <a:endParaRPr lang="en-US" dirty="0"/>
+          </a:p>
+        </p:txBody>
+      </p:sp>
+      <p:sp>
+        <p:nvSpPr>
+          <p:cNvPr id="3" name="Content Placeholder 2"/>
+          <p:cNvSpPr>
+            <a:spLocks noGrp="1"/>
+          </p:cNvSpPr>
+          <p:nvPr>
+            <p:ph idx="1"/>
+          </p:nvPr>
+        </p:nvSpPr>
+        <p:spPr>
+          <a:xfrm>
+            <a:off x="186771" y="1257662"/>
+            <a:ext cx="8500029" cy="5304599"/>
+          </a:xfrm>
+        </p:spPr>
+        <p:txBody>
+          <a:bodyPr>
+            <a:normAutofit lnSpcReduction="10000"/>
+          </a:bodyPr>
+          <a:lstStyle/>
+          <a:p>
+            <a:r>
+              <a:rPr lang="en-US" dirty="0" smtClean="0"/>
+              <a:t>Write your interfaces first</a:t>
+            </a:r>
+          </a:p>
+          <a:p>
+            <a:r>
+              <a:rPr lang="en-US" dirty="0" smtClean="0"/>
+              <a:t>Learn to use standard interfaces</a:t>
+            </a:r>
+          </a:p>
+          <a:p>
+            <a:pPr lvl="1"/>
+            <a:r>
+              <a:rPr lang="en-US" dirty="0" smtClean="0"/>
+              <a:t>Command-line with GNU-style long options</a:t>
+            </a:r>
+          </a:p>
+          <a:p>
+            <a:pPr lvl="1"/>
+            <a:r>
+              <a:rPr lang="en-US" dirty="0" smtClean="0"/>
+              <a:t>Data interfaces like SQL</a:t>
+            </a:r>
+          </a:p>
+          <a:p>
+            <a:pPr lvl="1"/>
+            <a:r>
+              <a:rPr lang="en-US" dirty="0" smtClean="0"/>
+              <a:t>File formats</a:t>
+            </a:r>
+          </a:p>
+          <a:p>
+            <a:pPr lvl="2"/>
+            <a:r>
+              <a:rPr lang="en-US" dirty="0" smtClean="0"/>
+              <a:t>if possible, domain-specific formats (e.g., FASTA, NEXUS)</a:t>
+            </a:r>
+          </a:p>
+          <a:p>
+            <a:pPr lvl="2"/>
+            <a:r>
+              <a:rPr lang="en-US" dirty="0" smtClean="0"/>
+              <a:t>if not, flexible &amp; auto-</a:t>
+            </a:r>
+            <a:r>
+              <a:rPr lang="en-US" dirty="0" err="1" smtClean="0"/>
+              <a:t>parseable</a:t>
+            </a:r>
+            <a:r>
+              <a:rPr lang="en-US" dirty="0" smtClean="0"/>
+              <a:t> formats like </a:t>
+            </a:r>
+          </a:p>
+          <a:p>
+            <a:pPr lvl="3"/>
+            <a:r>
+              <a:rPr lang="en-US" dirty="0" smtClean="0"/>
+              <a:t>XML files </a:t>
+            </a:r>
+          </a:p>
+          <a:p>
+            <a:pPr lvl="3"/>
+            <a:r>
+              <a:rPr lang="en-US" dirty="0" smtClean="0"/>
+              <a:t>CSV files</a:t>
+            </a:r>
+          </a:p>
+          <a:p>
+            <a:pPr lvl="3"/>
+            <a:r>
+              <a:rPr lang="en-US" dirty="0" smtClean="0"/>
+              <a:t>SQL command files</a:t>
+            </a:r>
+          </a:p>
+          <a:p>
+            <a:pPr lvl="3"/>
+            <a:r>
+              <a:rPr lang="en-US" dirty="0" smtClean="0"/>
+              <a:t>Perl dump files</a:t>
+            </a:r>
+          </a:p>
+          <a:p>
+            <a:pPr lvl="2"/>
+            <a:r>
+              <a:rPr lang="en-US" dirty="0" smtClean="0"/>
+              <a:t>Think twice before inventing another ad hoc text format</a:t>
+            </a:r>
+            <a:endParaRPr lang="en-US" dirty="0"/>
+          </a:p>
+        </p:txBody>
+      </p:sp>
+    </p:spTree>
+  </p:cSld>
+  <p:clrMapOvr>
+    <a:masterClrMapping/>
+  </p:clrMapOvr>
+  <p:timing>
+    <p:tnLst>
+      <p:par>
+        <p:cTn id="1" dur="indefinite" restart="never" nodeType="tmRoot"/>
+      </p:par>
+    </p:tnLst>
+  </p:timing>
+</p:sld>
+</file>
+
+<file path=ppt/slides/slide9.xml><?xml version="1.0" encoding="utf-8"?>
 <p:sld xmlns:a="http://schemas.openxmlformats.org/drawingml/2006/main" xmlns:r="http://schemas.openxmlformats.org/officeDocument/2006/relationships" xmlns:mc="http://schemas.openxmlformats.org/markup-compatibility/2006" xmlns:mv="urn:schemas-microsoft-com:mac:vml" xmlns:p="http://schemas.openxmlformats.org/presentationml/2006/main" mc:Ignorable="mv" mc:PreserveAttributes="mv:*">
   <p:cSld>
     <p:spTree>
@@ -16208,221 +16803,13 @@
   <p:clrMapOvr>
     <a:masterClrMapping/>
   </p:clrMapOvr>
-</p:sld>
-</file>
-
-<file path=ppt/slides/slide9.xml><?xml version="1.0" encoding="utf-8"?>
-<p:sld xmlns:a="http://schemas.openxmlformats.org/drawingml/2006/main" xmlns:r="http://schemas.openxmlformats.org/officeDocument/2006/relationships" xmlns:mc="http://schemas.openxmlformats.org/markup-compatibility/2006" xmlns:mv="urn:schemas-microsoft-com:mac:vml" xmlns:p="http://schemas.openxmlformats.org/presentationml/2006/main" mc:Ignorable="mv" mc:PreserveAttributes="mv:*">
-  <p:cSld>
-    <p:spTree>
-      <p:nvGrpSpPr>
-        <p:cNvPr id="1" name=""/>
-        <p:cNvGrpSpPr/>
-        <p:nvPr/>
-      </p:nvGrpSpPr>
-      <p:grpSpPr>
-        <a:xfrm>
-          <a:off x="0" y="0"/>
-          <a:ext cx="0" cy="0"/>
-          <a:chOff x="0" y="0"/>
-          <a:chExt cx="0" cy="0"/>
-        </a:xfrm>
-      </p:grpSpPr>
-      <p:sp>
-        <p:nvSpPr>
-          <p:cNvPr id="2" name="Title 1"/>
-          <p:cNvSpPr>
-            <a:spLocks noGrp="1"/>
-          </p:cNvSpPr>
-          <p:nvPr>
-            <p:ph type="title"/>
-          </p:nvPr>
-        </p:nvSpPr>
-        <p:spPr/>
-        <p:txBody>
-          <a:bodyPr/>
-          <a:lstStyle/>
-          <a:p>
-            <a:r>
-              <a:rPr lang="en-US" dirty="0" smtClean="0"/>
-              <a:t>3. Write code to be understood</a:t>
-            </a:r>
-            <a:endParaRPr lang="en-US" dirty="0"/>
-          </a:p>
-        </p:txBody>
-      </p:sp>
-      <p:sp>
-        <p:nvSpPr>
-          <p:cNvPr id="3" name="Content Placeholder 2"/>
-          <p:cNvSpPr>
-            <a:spLocks noGrp="1"/>
-          </p:cNvSpPr>
-          <p:nvPr>
-            <p:ph idx="1"/>
-          </p:nvPr>
-        </p:nvSpPr>
-        <p:spPr/>
-        <p:txBody>
-          <a:bodyPr>
-            <a:normAutofit/>
-          </a:bodyPr>
-          <a:lstStyle/>
-          <a:p>
-            <a:r>
-              <a:rPr lang="en-US" dirty="0" smtClean="0"/>
-              <a:t>Use informative names </a:t>
-            </a:r>
-          </a:p>
-          <a:p>
-            <a:pPr lvl="1"/>
-            <a:r>
-              <a:rPr lang="en-US" dirty="0" smtClean="0"/>
-              <a:t>e.g., $</a:t>
-            </a:r>
-            <a:r>
-              <a:rPr lang="en-US" dirty="0" err="1" smtClean="0"/>
-              <a:t>codonCount</a:t>
-            </a:r>
-            <a:r>
-              <a:rPr lang="en-US" dirty="0" smtClean="0"/>
-              <a:t> not $var1</a:t>
-            </a:r>
-          </a:p>
-          <a:p>
-            <a:pPr lvl="1"/>
-            <a:r>
-              <a:rPr lang="en-US" dirty="0" smtClean="0"/>
-              <a:t>To compose names, use a rule</a:t>
-            </a:r>
-          </a:p>
-          <a:p>
-            <a:pPr lvl="2"/>
-            <a:r>
-              <a:rPr lang="en-US" sz="1400" b="1" dirty="0" smtClean="0">
-                <a:latin typeface="Monaco"/>
-                <a:cs typeface="Monaco"/>
-              </a:rPr>
-              <a:t>$</a:t>
-            </a:r>
-            <a:r>
-              <a:rPr lang="en-US" sz="1400" b="1" dirty="0" err="1" smtClean="0">
-                <a:latin typeface="Monaco"/>
-                <a:cs typeface="Monaco"/>
-              </a:rPr>
-              <a:t>seq_length_variance</a:t>
-            </a:r>
-            <a:r>
-              <a:rPr lang="en-US" sz="1400" b="1" dirty="0" smtClean="0">
-                <a:latin typeface="Monaco"/>
-                <a:cs typeface="Monaco"/>
-              </a:rPr>
-              <a:t> = &amp;</a:t>
-            </a:r>
-            <a:r>
-              <a:rPr lang="en-US" sz="1400" b="1" dirty="0" err="1" smtClean="0">
-                <a:latin typeface="Monaco"/>
-                <a:cs typeface="Monaco"/>
-              </a:rPr>
-              <a:t>variance_of(&amp;lengths_of(@seqs</a:t>
-            </a:r>
-            <a:r>
-              <a:rPr lang="en-US" sz="1400" b="1" dirty="0" smtClean="0">
-                <a:latin typeface="Monaco"/>
-                <a:cs typeface="Monaco"/>
-              </a:rPr>
-              <a:t>))</a:t>
-            </a:r>
-            <a:endParaRPr lang="en-US" dirty="0" smtClean="0"/>
-          </a:p>
-          <a:p>
-            <a:pPr lvl="2"/>
-            <a:r>
-              <a:rPr lang="en-US" sz="1400" b="1" dirty="0" smtClean="0">
-                <a:latin typeface="Monaco"/>
-                <a:cs typeface="Monaco"/>
-              </a:rPr>
-              <a:t>$</a:t>
-            </a:r>
-            <a:r>
-              <a:rPr lang="en-US" sz="1400" b="1" dirty="0" err="1" smtClean="0">
-                <a:latin typeface="Monaco"/>
-                <a:cs typeface="Monaco"/>
-              </a:rPr>
-              <a:t>seq_length_variance</a:t>
-            </a:r>
-            <a:r>
-              <a:rPr lang="en-US" sz="1400" b="1" dirty="0" smtClean="0">
-                <a:latin typeface="Monaco"/>
-                <a:cs typeface="Monaco"/>
-              </a:rPr>
-              <a:t> = &amp;</a:t>
-            </a:r>
-            <a:r>
-              <a:rPr lang="en-US" sz="1400" b="1" dirty="0" err="1" smtClean="0">
-                <a:latin typeface="Monaco"/>
-                <a:cs typeface="Monaco"/>
-              </a:rPr>
-              <a:t>variance(&amp;seq_lengths(@seqs</a:t>
-            </a:r>
-            <a:r>
-              <a:rPr lang="en-US" sz="1400" b="1" dirty="0" smtClean="0">
-                <a:latin typeface="Monaco"/>
-                <a:cs typeface="Monaco"/>
-              </a:rPr>
-              <a:t>));</a:t>
-            </a:r>
-          </a:p>
-          <a:p>
-            <a:pPr lvl="2"/>
-            <a:endParaRPr lang="en-US" sz="1400" b="1" dirty="0">
-              <a:latin typeface="Monaco"/>
-              <a:cs typeface="Monaco"/>
-            </a:endParaRPr>
-          </a:p>
-          <a:p>
-            <a:pPr lvl="1"/>
-            <a:r>
-              <a:rPr lang="en-US" dirty="0" err="1" smtClean="0"/>
-              <a:t>gnu_style_underscores</a:t>
-            </a:r>
-            <a:r>
-              <a:rPr lang="en-US" dirty="0" smtClean="0"/>
-              <a:t> or </a:t>
-            </a:r>
-            <a:r>
-              <a:rPr lang="en-US" dirty="0" err="1" smtClean="0"/>
-              <a:t>oldSchoolCamelCase</a:t>
-            </a:r>
-            <a:endParaRPr lang="en-US" dirty="0" smtClean="0"/>
-          </a:p>
-          <a:p>
-            <a:r>
-              <a:rPr lang="en-US" dirty="0" smtClean="0"/>
-              <a:t>Document code internally </a:t>
-            </a:r>
-          </a:p>
-          <a:p>
-            <a:pPr lvl="1"/>
-            <a:r>
-              <a:rPr lang="en-US" dirty="0" smtClean="0"/>
-              <a:t>Document interfaces and dependencies</a:t>
-            </a:r>
-          </a:p>
-          <a:p>
-            <a:pPr lvl="1"/>
-            <a:r>
-              <a:rPr lang="en-US" dirty="0" smtClean="0"/>
-              <a:t>Document internal functions (methods) </a:t>
-            </a:r>
-            <a:endParaRPr lang="en-US" dirty="0"/>
-          </a:p>
-        </p:txBody>
-      </p:sp>
-    </p:spTree>
-  </p:cSld>
-  <p:clrMapOvr>
-    <a:masterClrMapping/>
-  </p:clrMapOvr>
+  <p:timing>
+    <p:tnLst>
+      <p:par>
+        <p:cTn id="1" dur="indefinite" restart="never" nodeType="tmRoot"/>
+      </p:par>
+    </p:tnLst>
+  </p:timing>
 </p:sld>
 </file>
 

</xml_diff>